<commit_message>
version 1.1.0 with Ramps and InterventionVariables
</commit_message>
<xml_diff>
--- a/RJDProcessor/doc/package_description/RJDemetra tools for statistical production.pptx
+++ b/RJDProcessor/doc/package_description/RJDemetra tools for statistical production.pptx
@@ -291,7 +291,7 @@
               <a:pPr>
                 <a:defRPr/>
               </a:pPr>
-              <a:t>7/8/2024</a:t>
+              <a:t>12/16/2024</a:t>
             </a:fld>
             <a:endParaRPr lang="en-US"/>
           </a:p>
@@ -9305,8 +9305,8 @@
         </p:nvSpPr>
         <p:spPr>
           <a:xfrm>
-            <a:off x="74431" y="1220428"/>
-            <a:ext cx="12067954" cy="5801588"/>
+            <a:off x="74431" y="986508"/>
+            <a:ext cx="12067954" cy="4647426"/>
           </a:xfrm>
           <a:prstGeom prst="rect">
             <a:avLst/>
@@ -9468,28 +9468,24 @@
               <a:buChar char="o"/>
             </a:pPr>
             <a:r>
-              <a:rPr lang="it-IT" sz="2000" b="1" dirty="0" smtClean="0">
+              <a:rPr lang="en-US" sz="2000" b="1" dirty="0" err="1">
                 <a:solidFill>
                   <a:srgbClr val="C00000"/>
                 </a:solidFill>
               </a:rPr>
-              <a:t>TODO </a:t>
-            </a:r>
-            <a:r>
-              <a:rPr lang="it-IT" sz="2000" b="1" dirty="0" err="1" smtClean="0">
+              <a:t>i</a:t>
+            </a:r>
+            <a:r>
+              <a:rPr lang="en-US" sz="2000" b="1" dirty="0" err="1" smtClean="0">
                 <a:solidFill>
                   <a:srgbClr val="C00000"/>
                 </a:solidFill>
               </a:rPr>
-              <a:t>userdef.vars.intervention</a:t>
-            </a:r>
-            <a:r>
-              <a:rPr lang="it-IT" sz="2000" dirty="0" smtClean="0"/>
-              <a:t>: </a:t>
+              <a:t>ntervention_variables</a:t>
             </a:r>
             <a:r>
               <a:rPr lang="en-US" sz="2000" dirty="0" smtClean="0"/>
-              <a:t> a </a:t>
+              <a:t>:  a </a:t>
             </a:r>
             <a:r>
               <a:rPr lang="en-US" sz="2000" dirty="0"/>
@@ -9718,20 +9714,12 @@
               <a:buChar char="o"/>
             </a:pPr>
             <a:r>
-              <a:rPr lang="it-IT" sz="2000" b="1" dirty="0" smtClean="0">
+              <a:rPr lang="it-IT" sz="2000" b="1" dirty="0" err="1" smtClean="0">
                 <a:solidFill>
                   <a:srgbClr val="C00000"/>
                 </a:solidFill>
               </a:rPr>
-              <a:t>TODO </a:t>
-            </a:r>
-            <a:r>
-              <a:rPr lang="it-IT" sz="2000" b="1" dirty="0" err="1" smtClean="0">
-                <a:solidFill>
-                  <a:srgbClr val="C00000"/>
-                </a:solidFill>
-              </a:rPr>
-              <a:t>userdef.vars.ramps</a:t>
+              <a:t>ramps</a:t>
             </a:r>
             <a:r>
               <a:rPr lang="it-IT" sz="2000" dirty="0" smtClean="0"/>
@@ -9851,11 +9839,7 @@
             </a:r>
             <a:r>
               <a:rPr lang="it-IT" sz="2000" dirty="0" smtClean="0"/>
-              <a:t>: </a:t>
-            </a:r>
-            <a:r>
-              <a:rPr lang="it-IT" sz="2000" dirty="0" smtClean="0"/>
-              <a:t>a </a:t>
+              <a:t>: a </a:t>
             </a:r>
             <a:r>
               <a:rPr lang="it-IT" sz="2000" dirty="0" err="1" smtClean="0"/>
@@ -9879,15 +9863,7 @@
             </a:r>
             <a:r>
               <a:rPr lang="it-IT" sz="2000" dirty="0" smtClean="0"/>
-              <a:t> the </a:t>
-            </a:r>
-            <a:r>
-              <a:rPr lang="it-IT" sz="2000" dirty="0" smtClean="0"/>
-              <a:t>end </a:t>
-            </a:r>
-            <a:r>
-              <a:rPr lang="it-IT" sz="2000" dirty="0" smtClean="0"/>
-              <a:t>time of the </a:t>
+              <a:t> the end time of the </a:t>
             </a:r>
             <a:r>
               <a:rPr lang="it-IT" sz="2000" dirty="0" err="1" smtClean="0"/>
@@ -9897,20 +9873,7 @@
               <a:rPr lang="it-IT" sz="2000" dirty="0" smtClean="0"/>
               <a:t>;</a:t>
             </a:r>
-          </a:p>
-          <a:p>
-            <a:pPr marL="1371600" lvl="2" indent="-457200" algn="just">
-              <a:spcAft>
-                <a:spcPts val="1200"/>
-              </a:spcAft>
-              <a:buFont typeface="Arial" panose="020B0604020202020204" pitchFamily="34" charset="0"/>
-              <a:buChar char="•"/>
-            </a:pPr>
             <a:endParaRPr lang="it-IT" sz="2300" dirty="0" smtClean="0"/>
-          </a:p>
-          <a:p>
-            <a:pPr lvl="2" algn="just"/>
-            <a:endParaRPr lang="it-IT" sz="3200" dirty="0"/>
           </a:p>
         </p:txBody>
       </p:sp>
@@ -9965,6 +9928,202 @@
               </a:solidFill>
               <a:latin typeface="Arial" panose="020B0604020202020204" pitchFamily="34" charset="0"/>
               <a:cs typeface="Arial" panose="020B0604020202020204" pitchFamily="34" charset="0"/>
+            </a:endParaRPr>
+          </a:p>
+        </p:txBody>
+      </p:sp>
+      <p:sp>
+        <p:nvSpPr>
+          <p:cNvPr id="2" name="Rettangolo 1"/>
+          <p:cNvSpPr/>
+          <p:nvPr/>
+        </p:nvSpPr>
+        <p:spPr>
+          <a:xfrm>
+            <a:off x="415588" y="5795085"/>
+            <a:ext cx="10333928" cy="923330"/>
+          </a:xfrm>
+          <a:prstGeom prst="rect">
+            <a:avLst/>
+          </a:prstGeom>
+          <a:solidFill>
+            <a:srgbClr val="C00000"/>
+          </a:solidFill>
+        </p:spPr>
+        <p:txBody>
+          <a:bodyPr wrap="square">
+            <a:spAutoFit/>
+          </a:bodyPr>
+          <a:lstStyle/>
+          <a:p>
+            <a:r>
+              <a:rPr lang="it-IT" b="1" dirty="0" smtClean="0">
+                <a:solidFill>
+                  <a:schemeClr val="bg1"/>
+                </a:solidFill>
+              </a:rPr>
+              <a:t>EX. of </a:t>
+            </a:r>
+            <a:r>
+              <a:rPr lang="it-IT" b="1" dirty="0" err="1" smtClean="0">
+                <a:solidFill>
+                  <a:schemeClr val="bg1"/>
+                </a:solidFill>
+              </a:rPr>
+              <a:t>RAMPs</a:t>
+            </a:r>
+            <a:r>
+              <a:rPr lang="it-IT" b="1" dirty="0" smtClean="0">
+                <a:solidFill>
+                  <a:schemeClr val="bg1"/>
+                </a:solidFill>
+              </a:rPr>
+              <a:t>: </a:t>
+            </a:r>
+            <a:r>
+              <a:rPr lang="it-IT" dirty="0" smtClean="0">
+                <a:solidFill>
+                  <a:schemeClr val="bg1"/>
+                </a:solidFill>
+              </a:rPr>
+              <a:t>[{"start":"2020-01-01","end":"2020-12-31"},{"start":"2008-01-01","end":"2009-01-01"}]</a:t>
+            </a:r>
+          </a:p>
+          <a:p>
+            <a:r>
+              <a:rPr lang="it-IT" b="1" dirty="0" smtClean="0">
+                <a:solidFill>
+                  <a:schemeClr val="bg1"/>
+                </a:solidFill>
+              </a:rPr>
+              <a:t>EX. </a:t>
+            </a:r>
+            <a:r>
+              <a:rPr lang="it-IT" b="1" dirty="0">
+                <a:solidFill>
+                  <a:schemeClr val="bg1"/>
+                </a:solidFill>
+              </a:rPr>
+              <a:t>of </a:t>
+            </a:r>
+            <a:r>
+              <a:rPr lang="it-IT" b="1" dirty="0" err="1" smtClean="0">
+                <a:solidFill>
+                  <a:schemeClr val="bg1"/>
+                </a:solidFill>
+              </a:rPr>
+              <a:t>IVs</a:t>
+            </a:r>
+            <a:r>
+              <a:rPr lang="it-IT" b="1" dirty="0" smtClean="0">
+                <a:solidFill>
+                  <a:schemeClr val="bg1"/>
+                </a:solidFill>
+              </a:rPr>
+              <a:t>:</a:t>
+            </a:r>
+            <a:r>
+              <a:rPr lang="it-IT" dirty="0" smtClean="0">
+                <a:solidFill>
+                  <a:schemeClr val="bg1"/>
+                </a:solidFill>
+              </a:rPr>
+              <a:t>        [{"delta":</a:t>
+            </a:r>
+            <a:r>
+              <a:rPr lang="it-IT" dirty="0">
+                <a:solidFill>
+                  <a:schemeClr val="bg1"/>
+                </a:solidFill>
+              </a:rPr>
+              <a:t>1</a:t>
+            </a:r>
+            <a:r>
+              <a:rPr lang="it-IT" dirty="0" smtClean="0">
+                <a:solidFill>
+                  <a:schemeClr val="bg1"/>
+                </a:solidFill>
+              </a:rPr>
+              <a:t>,"delta_s":</a:t>
+            </a:r>
+            <a:r>
+              <a:rPr lang="it-IT" dirty="0">
+                <a:solidFill>
+                  <a:schemeClr val="bg1"/>
+                </a:solidFill>
+              </a:rPr>
+              <a:t>1</a:t>
+            </a:r>
+            <a:r>
+              <a:rPr lang="it-IT" dirty="0" smtClean="0">
+                <a:solidFill>
+                  <a:schemeClr val="bg1"/>
+                </a:solidFill>
+              </a:rPr>
+              <a:t>,"seq":[{"start":"2001-01-01","end": "2001-12-31" }]}, </a:t>
+            </a:r>
+          </a:p>
+          <a:p>
+            <a:r>
+              <a:rPr lang="it-IT">
+                <a:solidFill>
+                  <a:schemeClr val="bg1"/>
+                </a:solidFill>
+              </a:rPr>
+              <a:t> </a:t>
+            </a:r>
+            <a:r>
+              <a:rPr lang="it-IT" smtClean="0">
+                <a:solidFill>
+                  <a:schemeClr val="bg1"/>
+                </a:solidFill>
+              </a:rPr>
+              <a:t>                          {"</a:t>
+            </a:r>
+            <a:r>
+              <a:rPr lang="it-IT" dirty="0" smtClean="0">
+                <a:solidFill>
+                  <a:schemeClr val="bg1"/>
+                </a:solidFill>
+              </a:rPr>
+              <a:t>delta":</a:t>
+            </a:r>
+            <a:r>
+              <a:rPr lang="it-IT" dirty="0">
+                <a:solidFill>
+                  <a:schemeClr val="bg1"/>
+                </a:solidFill>
+              </a:rPr>
+              <a:t>0.75</a:t>
+            </a:r>
+            <a:r>
+              <a:rPr lang="it-IT" dirty="0" smtClean="0">
+                <a:solidFill>
+                  <a:schemeClr val="bg1"/>
+                </a:solidFill>
+              </a:rPr>
+              <a:t>,"delta_s":</a:t>
+            </a:r>
+            <a:r>
+              <a:rPr lang="it-IT" dirty="0">
+                <a:solidFill>
+                  <a:schemeClr val="bg1"/>
+                </a:solidFill>
+              </a:rPr>
+              <a:t>0</a:t>
+            </a:r>
+            <a:r>
+              <a:rPr lang="it-IT" dirty="0" smtClean="0">
+                <a:solidFill>
+                  <a:schemeClr val="bg1"/>
+                </a:solidFill>
+              </a:rPr>
+              <a:t>,"seq":[{"start":"2004-01-01","end":"2005-12-31"}]}]</a:t>
+            </a:r>
+            <a:endParaRPr lang="it-IT" dirty="0">
+              <a:solidFill>
+                <a:schemeClr val="bg1"/>
+              </a:solidFill>
             </a:endParaRPr>
           </a:p>
         </p:txBody>
@@ -28750,11 +28909,7 @@
             </a:r>
             <a:r>
               <a:rPr lang="it-IT" sz="2300" dirty="0" smtClean="0"/>
-              <a:t> data</a:t>
-            </a:r>
-            <a:r>
-              <a:rPr lang="it-IT" sz="2300" dirty="0" smtClean="0"/>
-              <a:t>;</a:t>
+              <a:t> data;</a:t>
             </a:r>
           </a:p>
           <a:p>
@@ -28809,7 +28964,6 @@
               <a:rPr lang="it-IT" sz="2300" dirty="0" smtClean="0"/>
               <a:t>) </a:t>
             </a:r>
-            <a:endParaRPr lang="it-IT" sz="2300" dirty="0" smtClean="0"/>
           </a:p>
         </p:txBody>
       </p:sp>
@@ -29454,6 +29608,15 @@
 
 <file path=customXml/item1.xml><?xml version="1.0" encoding="utf-8"?>
 <?mso-contentType ?>
+<FormTemplates xmlns="http://schemas.microsoft.com/sharepoint/v3/contenttype/forms">
+  <Display>DocumentLibraryForm</Display>
+  <Edit>DocumentLibraryForm</Edit>
+  <New>DocumentLibraryForm</New>
+</FormTemplates>
+</file>
+
+<file path=customXml/item2.xml><?xml version="1.0" encoding="utf-8"?>
+<?mso-contentType ?>
 <spe:Receivers xmlns:spe="http://schemas.microsoft.com/sharepoint/events">
   <Receiver>
     <Name>Document ID Generator</Name>
@@ -29502,16 +29665,22 @@
 </spe:Receivers>
 </file>
 
-<file path=customXml/item2.xml><?xml version="1.0" encoding="utf-8"?>
-<?mso-contentType ?>
-<FormTemplates xmlns="http://schemas.microsoft.com/sharepoint/v3/contenttype/forms">
-  <Display>DocumentLibraryForm</Display>
-  <Edit>DocumentLibraryForm</Edit>
-  <New>DocumentLibraryForm</New>
-</FormTemplates>
+<file path=customXml/item3.xml><?xml version="1.0" encoding="utf-8"?>
+<p:properties xmlns:p="http://schemas.microsoft.com/office/2006/metadata/properties" xmlns:xsi="http://www.w3.org/2001/XMLSchema-instance" xmlns:pc="http://schemas.microsoft.com/office/infopath/2007/PartnerControls">
+  <documentManagement>
+    <SottoCategoria xmlns="679261c3-551f-4e86-913f-177e0e529669">-</SottoCategoria>
+    <Categoria xmlns="c58f2efd-82a8-4ecf-b395-8c25e928921d">3- Standard presentazioni Power Point</Categoria>
+    <_dlc_DocId xmlns="459159c4-d20a-4ff3-9b11-fbd127bd52e5">INTRANET-14-174</_dlc_DocId>
+    <_dlc_DocIdUrl xmlns="459159c4-d20a-4ff3-9b11-fbd127bd52e5">
+      <Url>https://intranet.istat.it/Collaborativi/_layouts/15/DocIdRedir.aspx?ID=INTRANET-14-174</Url>
+      <Description>INTRANET-14-174</Description>
+    </_dlc_DocIdUrl>
+    <Ordine xmlns="679261c3-551f-4e86-913f-177e0e529669">1</Ordine>
+  </documentManagement>
+</p:properties>
 </file>
 
-<file path=customXml/item3.xml><?xml version="1.0" encoding="utf-8"?>
+<file path=customXml/item4.xml><?xml version="1.0" encoding="utf-8"?>
 <ct:contentTypeSchema xmlns:ct="http://schemas.microsoft.com/office/2006/metadata/contentType" xmlns:ma="http://schemas.microsoft.com/office/2006/metadata/properties/metaAttributes" ct:_="" ma:_="" ma:contentTypeName="Documento" ma:contentTypeID="0x010100661A2BE3120D674DA36C11D6006822D4" ma:contentTypeVersion="5" ma:contentTypeDescription="Creare un nuovo documento." ma:contentTypeScope="" ma:versionID="742e6049321d93803bb3bb587f561ffa">
   <xsd:schema xmlns:xsd="http://www.w3.org/2001/XMLSchema" xmlns:xs="http://www.w3.org/2001/XMLSchema" xmlns:p="http://schemas.microsoft.com/office/2006/metadata/properties" xmlns:ns2="c58f2efd-82a8-4ecf-b395-8c25e928921d" xmlns:ns3="459159c4-d20a-4ff3-9b11-fbd127bd52e5" xmlns:ns4="679261c3-551f-4e86-913f-177e0e529669" targetNamespace="http://schemas.microsoft.com/office/2006/metadata/properties" ma:root="true" ma:fieldsID="939ae4a7eaec2950db97a79ca38d2d4d" ns2:_="" ns3:_="" ns4:_="">
     <xsd:import namespace="c58f2efd-82a8-4ecf-b395-8c25e928921d"/>
@@ -29704,22 +29873,15 @@
 </ct:contentTypeSchema>
 </file>
 
-<file path=customXml/item4.xml><?xml version="1.0" encoding="utf-8"?>
-<p:properties xmlns:p="http://schemas.microsoft.com/office/2006/metadata/properties" xmlns:xsi="http://www.w3.org/2001/XMLSchema-instance" xmlns:pc="http://schemas.microsoft.com/office/infopath/2007/PartnerControls">
-  <documentManagement>
-    <SottoCategoria xmlns="679261c3-551f-4e86-913f-177e0e529669">-</SottoCategoria>
-    <Categoria xmlns="c58f2efd-82a8-4ecf-b395-8c25e928921d">3- Standard presentazioni Power Point</Categoria>
-    <_dlc_DocId xmlns="459159c4-d20a-4ff3-9b11-fbd127bd52e5">INTRANET-14-174</_dlc_DocId>
-    <_dlc_DocIdUrl xmlns="459159c4-d20a-4ff3-9b11-fbd127bd52e5">
-      <Url>https://intranet.istat.it/Collaborativi/_layouts/15/DocIdRedir.aspx?ID=INTRANET-14-174</Url>
-      <Description>INTRANET-14-174</Description>
-    </_dlc_DocIdUrl>
-    <Ordine xmlns="679261c3-551f-4e86-913f-177e0e529669">1</Ordine>
-  </documentManagement>
-</p:properties>
+<file path=customXml/itemProps1.xml><?xml version="1.0" encoding="utf-8"?>
+<ds:datastoreItem xmlns:ds="http://schemas.openxmlformats.org/officeDocument/2006/customXml" ds:itemID="{BD9C238D-4D5C-4783-820B-4854DCE45D41}">
+  <ds:schemaRefs>
+    <ds:schemaRef ds:uri="http://schemas.microsoft.com/sharepoint/v3/contenttype/forms"/>
+  </ds:schemaRefs>
+</ds:datastoreItem>
 </file>
 
-<file path=customXml/itemProps1.xml><?xml version="1.0" encoding="utf-8"?>
+<file path=customXml/itemProps2.xml><?xml version="1.0" encoding="utf-8"?>
 <ds:datastoreItem xmlns:ds="http://schemas.openxmlformats.org/officeDocument/2006/customXml" ds:itemID="{D9296C4F-9DE9-4B43-AA80-1FC85656CFFA}">
   <ds:schemaRefs>
     <ds:schemaRef ds:uri="http://schemas.microsoft.com/sharepoint/events"/>
@@ -29727,15 +29889,25 @@
 </ds:datastoreItem>
 </file>
 
-<file path=customXml/itemProps2.xml><?xml version="1.0" encoding="utf-8"?>
-<ds:datastoreItem xmlns:ds="http://schemas.openxmlformats.org/officeDocument/2006/customXml" ds:itemID="{BD9C238D-4D5C-4783-820B-4854DCE45D41}">
+<file path=customXml/itemProps3.xml><?xml version="1.0" encoding="utf-8"?>
+<ds:datastoreItem xmlns:ds="http://schemas.openxmlformats.org/officeDocument/2006/customXml" ds:itemID="{3EF378BC-F4D0-4510-B4EC-07B6EFE18CF8}">
   <ds:schemaRefs>
-    <ds:schemaRef ds:uri="http://schemas.microsoft.com/sharepoint/v3/contenttype/forms"/>
+    <ds:schemaRef ds:uri="http://schemas.openxmlformats.org/package/2006/metadata/core-properties"/>
+    <ds:schemaRef ds:uri="http://schemas.microsoft.com/office/2006/documentManagement/types"/>
+    <ds:schemaRef ds:uri="http://www.w3.org/XML/1998/namespace"/>
+    <ds:schemaRef ds:uri="http://purl.org/dc/dcmitype/"/>
+    <ds:schemaRef ds:uri="http://schemas.microsoft.com/office/2006/metadata/properties"/>
+    <ds:schemaRef ds:uri="http://purl.org/dc/elements/1.1/"/>
+    <ds:schemaRef ds:uri="459159c4-d20a-4ff3-9b11-fbd127bd52e5"/>
+    <ds:schemaRef ds:uri="679261c3-551f-4e86-913f-177e0e529669"/>
+    <ds:schemaRef ds:uri="c58f2efd-82a8-4ecf-b395-8c25e928921d"/>
+    <ds:schemaRef ds:uri="http://schemas.microsoft.com/office/infopath/2007/PartnerControls"/>
+    <ds:schemaRef ds:uri="http://purl.org/dc/terms/"/>
   </ds:schemaRefs>
 </ds:datastoreItem>
 </file>
 
-<file path=customXml/itemProps3.xml><?xml version="1.0" encoding="utf-8"?>
+<file path=customXml/itemProps4.xml><?xml version="1.0" encoding="utf-8"?>
 <ds:datastoreItem xmlns:ds="http://schemas.openxmlformats.org/officeDocument/2006/customXml" ds:itemID="{AA760D03-2285-4F80-B9FC-1F4F97E97129}">
   <ds:schemaRefs>
     <ds:schemaRef ds:uri="http://schemas.microsoft.com/office/2006/metadata/contentType"/>
@@ -29753,22 +29925,4 @@
     <ds:schemaRef ds:uri="http://schemas.microsoft.com/internal/obd"/>
   </ds:schemaRefs>
 </ds:datastoreItem>
-</file>
-
-<file path=customXml/itemProps4.xml><?xml version="1.0" encoding="utf-8"?>
-<ds:datastoreItem xmlns:ds="http://schemas.openxmlformats.org/officeDocument/2006/customXml" ds:itemID="{3EF378BC-F4D0-4510-B4EC-07B6EFE18CF8}">
-  <ds:schemaRefs>
-    <ds:schemaRef ds:uri="c58f2efd-82a8-4ecf-b395-8c25e928921d"/>
-    <ds:schemaRef ds:uri="http://schemas.microsoft.com/office/2006/documentManagement/types"/>
-    <ds:schemaRef ds:uri="http://purl.org/dc/elements/1.1/"/>
-    <ds:schemaRef ds:uri="http://schemas.microsoft.com/office/infopath/2007/PartnerControls"/>
-    <ds:schemaRef ds:uri="679261c3-551f-4e86-913f-177e0e529669"/>
-    <ds:schemaRef ds:uri="http://schemas.openxmlformats.org/package/2006/metadata/core-properties"/>
-    <ds:schemaRef ds:uri="459159c4-d20a-4ff3-9b11-fbd127bd52e5"/>
-    <ds:schemaRef ds:uri="http://purl.org/dc/terms/"/>
-    <ds:schemaRef ds:uri="http://schemas.microsoft.com/office/2006/metadata/properties"/>
-    <ds:schemaRef ds:uri="http://www.w3.org/XML/1998/namespace"/>
-    <ds:schemaRef ds:uri="http://purl.org/dc/dcmitype/"/>
-  </ds:schemaRefs>
-</ds:datastoreItem>
 </file>
</xml_diff>

<commit_message>
Fixed coefficients support fixed/added
Ramps and Userdefined variables are ok. Intervention variables fixed coefficients are not supported yet. Need to test for JD+ predefined TD
</commit_message>
<xml_diff>
--- a/RJDProcessor/doc/package_description/RJDemetra tools for statistical production.pptx
+++ b/RJDProcessor/doc/package_description/RJDemetra tools for statistical production.pptx
@@ -291,7 +291,7 @@
               <a:pPr>
                 <a:defRPr/>
               </a:pPr>
-              <a:t>12/16/2024</a:t>
+              <a:t>1/3/2025</a:t>
             </a:fld>
             <a:endParaRPr lang="en-US"/>
           </a:p>
@@ -9306,7 +9306,7 @@
         <p:spPr>
           <a:xfrm>
             <a:off x="74431" y="986508"/>
-            <a:ext cx="12067954" cy="4647426"/>
+            <a:ext cx="12067954" cy="4736681"/>
           </a:xfrm>
           <a:prstGeom prst="rect">
             <a:avLst/>
@@ -9327,7 +9327,7 @@
               <a:buChar char="o"/>
             </a:pPr>
             <a:r>
-              <a:rPr lang="it-IT" sz="2000" b="1" dirty="0" err="1" smtClean="0">
+              <a:rPr lang="it-IT" b="1" dirty="0" err="1" smtClean="0">
                 <a:solidFill>
                   <a:srgbClr val="C00000"/>
                 </a:solidFill>
@@ -9335,76 +9335,76 @@
               <a:t>frequency</a:t>
             </a:r>
             <a:r>
-              <a:rPr lang="it-IT" sz="2000" dirty="0" smtClean="0"/>
+              <a:rPr lang="it-IT" dirty="0" smtClean="0"/>
               <a:t>:  </a:t>
             </a:r>
             <a:r>
-              <a:rPr lang="it-IT" sz="2000" dirty="0" err="1" smtClean="0"/>
+              <a:rPr lang="it-IT" dirty="0" err="1" smtClean="0"/>
               <a:t>numeric</a:t>
             </a:r>
             <a:r>
-              <a:rPr lang="it-IT" sz="2000" dirty="0" smtClean="0"/>
+              <a:rPr lang="it-IT" dirty="0" smtClean="0"/>
               <a:t>. </a:t>
             </a:r>
             <a:r>
-              <a:rPr lang="it-IT" sz="2000" dirty="0" err="1" smtClean="0"/>
+              <a:rPr lang="it-IT" dirty="0" err="1" smtClean="0"/>
               <a:t>Frequency</a:t>
             </a:r>
             <a:r>
-              <a:rPr lang="it-IT" sz="2000" dirty="0" smtClean="0"/>
+              <a:rPr lang="it-IT" dirty="0" smtClean="0"/>
               <a:t> of the data: E.g. </a:t>
             </a:r>
             <a:r>
-              <a:rPr lang="it-IT" sz="2000" dirty="0" err="1" smtClean="0"/>
+              <a:rPr lang="it-IT" dirty="0" err="1" smtClean="0"/>
               <a:t>frequency</a:t>
             </a:r>
             <a:r>
-              <a:rPr lang="it-IT" sz="2000" dirty="0" smtClean="0"/>
+              <a:rPr lang="it-IT" dirty="0" smtClean="0"/>
               <a:t>=4 </a:t>
             </a:r>
             <a:r>
-              <a:rPr lang="it-IT" sz="2000" dirty="0" smtClean="0">
+              <a:rPr lang="it-IT" dirty="0" smtClean="0">
                 <a:sym typeface="Wingdings" panose="05000000000000000000" pitchFamily="2" charset="2"/>
               </a:rPr>
               <a:t> </a:t>
             </a:r>
             <a:r>
-              <a:rPr lang="it-IT" sz="2000" dirty="0" err="1" smtClean="0">
+              <a:rPr lang="it-IT" dirty="0" err="1" smtClean="0">
                 <a:sym typeface="Wingdings" panose="05000000000000000000" pitchFamily="2" charset="2"/>
               </a:rPr>
               <a:t>quarterly</a:t>
             </a:r>
             <a:r>
-              <a:rPr lang="it-IT" sz="2000" dirty="0" smtClean="0">
+              <a:rPr lang="it-IT" dirty="0" smtClean="0">
                 <a:sym typeface="Wingdings" panose="05000000000000000000" pitchFamily="2" charset="2"/>
               </a:rPr>
               <a:t> data </a:t>
             </a:r>
             <a:r>
-              <a:rPr lang="it-IT" sz="2000" dirty="0" err="1" smtClean="0">
+              <a:rPr lang="it-IT" dirty="0" err="1" smtClean="0">
                 <a:sym typeface="Wingdings" panose="05000000000000000000" pitchFamily="2" charset="2"/>
               </a:rPr>
               <a:t>frequency</a:t>
             </a:r>
             <a:r>
-              <a:rPr lang="it-IT" sz="2000" dirty="0" smtClean="0">
+              <a:rPr lang="it-IT" dirty="0" smtClean="0">
                 <a:sym typeface="Wingdings" panose="05000000000000000000" pitchFamily="2" charset="2"/>
               </a:rPr>
               <a:t>=12  </a:t>
             </a:r>
             <a:r>
-              <a:rPr lang="it-IT" sz="2000" dirty="0" err="1" smtClean="0">
+              <a:rPr lang="it-IT" dirty="0" err="1" smtClean="0">
                 <a:sym typeface="Wingdings" panose="05000000000000000000" pitchFamily="2" charset="2"/>
               </a:rPr>
               <a:t>monthly</a:t>
             </a:r>
             <a:r>
-              <a:rPr lang="it-IT" sz="2000" dirty="0" smtClean="0">
+              <a:rPr lang="it-IT" dirty="0" smtClean="0">
                 <a:sym typeface="Wingdings" panose="05000000000000000000" pitchFamily="2" charset="2"/>
               </a:rPr>
               <a:t> data.</a:t>
             </a:r>
-            <a:endParaRPr lang="it-IT" sz="2000" dirty="0" smtClean="0"/>
+            <a:endParaRPr lang="it-IT" dirty="0" smtClean="0"/>
           </a:p>
           <a:p>
             <a:pPr marL="457200" indent="-457200" algn="just">
@@ -9415,7 +9415,7 @@
               <a:buChar char="o"/>
             </a:pPr>
             <a:r>
-              <a:rPr lang="it-IT" sz="2000" b="1" dirty="0" err="1">
+              <a:rPr lang="it-IT" b="1" dirty="0" err="1">
                 <a:solidFill>
                   <a:srgbClr val="C00000"/>
                 </a:solidFill>
@@ -9423,7 +9423,7 @@
               <a:t>m</a:t>
             </a:r>
             <a:r>
-              <a:rPr lang="it-IT" sz="2000" b="1" dirty="0" err="1" smtClean="0">
+              <a:rPr lang="it-IT" b="1" dirty="0" err="1" smtClean="0">
                 <a:solidFill>
                   <a:srgbClr val="C00000"/>
                 </a:solidFill>
@@ -9431,31 +9431,31 @@
               <a:t>ethod</a:t>
             </a:r>
             <a:r>
-              <a:rPr lang="it-IT" sz="2000" dirty="0" smtClean="0"/>
+              <a:rPr lang="it-IT" dirty="0" smtClean="0"/>
               <a:t>: "TS" for TRAMO-SEATS, "X" for X13 (X13 </a:t>
             </a:r>
             <a:r>
-              <a:rPr lang="it-IT" sz="2000" dirty="0" err="1" smtClean="0"/>
+              <a:rPr lang="it-IT" dirty="0" err="1" smtClean="0"/>
               <a:t>not</a:t>
             </a:r>
             <a:r>
-              <a:rPr lang="it-IT" sz="2000" dirty="0" smtClean="0"/>
+              <a:rPr lang="it-IT" dirty="0" smtClean="0"/>
               <a:t> </a:t>
             </a:r>
             <a:r>
-              <a:rPr lang="it-IT" sz="2000" dirty="0" err="1" smtClean="0"/>
+              <a:rPr lang="it-IT" dirty="0" err="1" smtClean="0"/>
               <a:t>implemented</a:t>
             </a:r>
             <a:r>
-              <a:rPr lang="it-IT" sz="2000" dirty="0" smtClean="0"/>
+              <a:rPr lang="it-IT" dirty="0" smtClean="0"/>
               <a:t> </a:t>
             </a:r>
             <a:r>
-              <a:rPr lang="it-IT" sz="2000" dirty="0" err="1" smtClean="0"/>
+              <a:rPr lang="it-IT" dirty="0" err="1" smtClean="0"/>
               <a:t>yet</a:t>
             </a:r>
             <a:r>
-              <a:rPr lang="it-IT" sz="2000" dirty="0" smtClean="0"/>
+              <a:rPr lang="it-IT" dirty="0" smtClean="0"/>
               <a:t>).</a:t>
             </a:r>
           </a:p>
@@ -9468,7 +9468,7 @@
               <a:buChar char="o"/>
             </a:pPr>
             <a:r>
-              <a:rPr lang="en-US" sz="2000" b="1" dirty="0" err="1">
+              <a:rPr lang="en-US" b="1" dirty="0" err="1">
                 <a:solidFill>
                   <a:srgbClr val="C00000"/>
                 </a:solidFill>
@@ -9476,7 +9476,7 @@
               <a:t>i</a:t>
             </a:r>
             <a:r>
-              <a:rPr lang="en-US" sz="2000" b="1" dirty="0" err="1" smtClean="0">
+              <a:rPr lang="en-US" b="1" dirty="0" err="1" smtClean="0">
                 <a:solidFill>
                   <a:srgbClr val="C00000"/>
                 </a:solidFill>
@@ -9484,15 +9484,15 @@
               <a:t>ntervention_variables</a:t>
             </a:r>
             <a:r>
-              <a:rPr lang="en-US" sz="2000" dirty="0" smtClean="0"/>
+              <a:rPr lang="en-US" dirty="0" smtClean="0"/>
               <a:t>:  a </a:t>
             </a:r>
             <a:r>
-              <a:rPr lang="en-US" sz="2000" dirty="0"/>
+              <a:rPr lang="en-US" dirty="0"/>
               <a:t>vector of JSON </a:t>
             </a:r>
             <a:r>
-              <a:rPr lang="en-US" sz="2000" dirty="0" smtClean="0"/>
+              <a:rPr lang="en-US" dirty="0" smtClean="0"/>
               <a:t>elements, each one with the attributes:</a:t>
             </a:r>
           </a:p>
@@ -9505,7 +9505,7 @@
               <a:buChar char="•"/>
             </a:pPr>
             <a:r>
-              <a:rPr lang="it-IT" sz="2000" dirty="0" smtClean="0">
+              <a:rPr lang="it-IT" dirty="0" smtClean="0">
                 <a:solidFill>
                   <a:srgbClr val="C00000"/>
                 </a:solidFill>
@@ -9513,18 +9513,18 @@
               <a:t>delta</a:t>
             </a:r>
             <a:r>
-              <a:rPr lang="it-IT" sz="2000" dirty="0" smtClean="0"/>
+              <a:rPr lang="it-IT" dirty="0" smtClean="0"/>
               <a:t>: </a:t>
             </a:r>
             <a:r>
-              <a:rPr lang="it-IT" sz="2000" dirty="0" err="1" smtClean="0"/>
+              <a:rPr lang="it-IT" dirty="0" err="1" smtClean="0"/>
               <a:t>Numeric</a:t>
             </a:r>
             <a:r>
-              <a:rPr lang="it-IT" sz="2000" dirty="0" smtClean="0"/>
+              <a:rPr lang="it-IT" dirty="0" smtClean="0"/>
               <a:t>;</a:t>
             </a:r>
-            <a:endParaRPr lang="it-IT" sz="2000" dirty="0"/>
+            <a:endParaRPr lang="it-IT" dirty="0"/>
           </a:p>
           <a:p>
             <a:pPr marL="1371600" lvl="2" indent="-457200" algn="just">
@@ -9535,7 +9535,7 @@
               <a:buChar char="•"/>
             </a:pPr>
             <a:r>
-              <a:rPr lang="it-IT" sz="2000" dirty="0" err="1">
+              <a:rPr lang="it-IT" dirty="0" err="1">
                 <a:solidFill>
                   <a:srgbClr val="C00000"/>
                 </a:solidFill>
@@ -9543,7 +9543,7 @@
               <a:t>d</a:t>
             </a:r>
             <a:r>
-              <a:rPr lang="it-IT" sz="2000" dirty="0" err="1" smtClean="0">
+              <a:rPr lang="it-IT" dirty="0" err="1" smtClean="0">
                 <a:solidFill>
                   <a:srgbClr val="C00000"/>
                 </a:solidFill>
@@ -9551,15 +9551,15 @@
               <a:t>elta_s</a:t>
             </a:r>
             <a:r>
-              <a:rPr lang="it-IT" sz="2000" dirty="0" smtClean="0"/>
+              <a:rPr lang="it-IT" dirty="0" smtClean="0"/>
               <a:t>: </a:t>
             </a:r>
             <a:r>
-              <a:rPr lang="it-IT" sz="2000" dirty="0" err="1" smtClean="0"/>
+              <a:rPr lang="it-IT" dirty="0" err="1" smtClean="0"/>
               <a:t>Numeric</a:t>
             </a:r>
             <a:r>
-              <a:rPr lang="it-IT" sz="2000" dirty="0" smtClean="0"/>
+              <a:rPr lang="it-IT" dirty="0" smtClean="0"/>
               <a:t>;</a:t>
             </a:r>
           </a:p>
@@ -9572,7 +9572,7 @@
               <a:buChar char="•"/>
             </a:pPr>
             <a:r>
-              <a:rPr lang="it-IT" sz="2000" dirty="0" err="1">
+              <a:rPr lang="it-IT" dirty="0" err="1">
                 <a:solidFill>
                   <a:srgbClr val="C00000"/>
                 </a:solidFill>
@@ -9580,7 +9580,7 @@
               <a:t>s</a:t>
             </a:r>
             <a:r>
-              <a:rPr lang="it-IT" sz="2000" dirty="0" err="1" smtClean="0">
+              <a:rPr lang="it-IT" dirty="0" err="1" smtClean="0">
                 <a:solidFill>
                   <a:srgbClr val="C00000"/>
                 </a:solidFill>
@@ -9588,38 +9588,38 @@
               <a:t>equences</a:t>
             </a:r>
             <a:r>
-              <a:rPr lang="it-IT" sz="2000" dirty="0" smtClean="0"/>
+              <a:rPr lang="it-IT" dirty="0" smtClean="0"/>
               <a:t>: JSON array: </a:t>
             </a:r>
             <a:r>
-              <a:rPr lang="it-IT" sz="2000" dirty="0" err="1" smtClean="0"/>
+              <a:rPr lang="it-IT" dirty="0" err="1" smtClean="0"/>
               <a:t>every</a:t>
             </a:r>
             <a:r>
-              <a:rPr lang="it-IT" sz="2000" dirty="0" smtClean="0"/>
+              <a:rPr lang="it-IT" dirty="0" smtClean="0"/>
               <a:t> </a:t>
             </a:r>
             <a:r>
-              <a:rPr lang="it-IT" sz="2000" dirty="0" err="1" smtClean="0"/>
+              <a:rPr lang="it-IT" dirty="0" err="1" smtClean="0"/>
               <a:t>element</a:t>
             </a:r>
             <a:r>
-              <a:rPr lang="it-IT" sz="2000" dirty="0" smtClean="0"/>
+              <a:rPr lang="it-IT" dirty="0" smtClean="0"/>
               <a:t> </a:t>
             </a:r>
             <a:r>
-              <a:rPr lang="it-IT" sz="2000" dirty="0" err="1" smtClean="0"/>
+              <a:rPr lang="it-IT" dirty="0" err="1" smtClean="0"/>
               <a:t>has</a:t>
             </a:r>
             <a:r>
-              <a:rPr lang="it-IT" sz="2000" dirty="0" smtClean="0"/>
+              <a:rPr lang="it-IT" dirty="0" smtClean="0"/>
               <a:t> the </a:t>
             </a:r>
             <a:r>
-              <a:rPr lang="it-IT" sz="2000" dirty="0" err="1" smtClean="0"/>
+              <a:rPr lang="it-IT" dirty="0" err="1" smtClean="0"/>
               <a:t>fields</a:t>
             </a:r>
-            <a:endParaRPr lang="it-IT" sz="2000" dirty="0" smtClean="0"/>
+            <a:endParaRPr lang="it-IT" dirty="0" smtClean="0"/>
           </a:p>
           <a:p>
             <a:pPr marL="4114800" lvl="8" indent="-457200" algn="just">
@@ -9630,7 +9630,7 @@
               <a:buChar char="•"/>
             </a:pPr>
             <a:r>
-              <a:rPr lang="it-IT" sz="2000" dirty="0" smtClean="0">
+              <a:rPr lang="it-IT" dirty="0" smtClean="0">
                 <a:solidFill>
                   <a:srgbClr val="C00000"/>
                 </a:solidFill>
@@ -9638,26 +9638,26 @@
               <a:t>start: </a:t>
             </a:r>
             <a:r>
-              <a:rPr lang="it-IT" sz="2000" dirty="0"/>
+              <a:rPr lang="it-IT" dirty="0"/>
               <a:t>a </a:t>
             </a:r>
             <a:r>
-              <a:rPr lang="it-IT" sz="2000" dirty="0" err="1"/>
+              <a:rPr lang="it-IT" dirty="0" err="1"/>
               <a:t>character</a:t>
             </a:r>
             <a:r>
-              <a:rPr lang="it-IT" sz="2000" dirty="0"/>
+              <a:rPr lang="it-IT" dirty="0"/>
               <a:t> </a:t>
             </a:r>
             <a:r>
-              <a:rPr lang="it-IT" sz="2000" dirty="0" err="1"/>
+              <a:rPr lang="it-IT" dirty="0" err="1"/>
               <a:t>string</a:t>
             </a:r>
             <a:r>
-              <a:rPr lang="it-IT" sz="2000" dirty="0"/>
+              <a:rPr lang="it-IT" dirty="0"/>
               <a:t> in the format "YYYY-MM-DD" </a:t>
             </a:r>
-            <a:endParaRPr lang="it-IT" sz="2000" dirty="0" smtClean="0">
+            <a:endParaRPr lang="it-IT" dirty="0" smtClean="0">
               <a:solidFill>
                 <a:srgbClr val="C00000"/>
               </a:solidFill>
@@ -9672,7 +9672,7 @@
               <a:buChar char="•"/>
             </a:pPr>
             <a:r>
-              <a:rPr lang="it-IT" sz="2000" dirty="0" smtClean="0">
+              <a:rPr lang="it-IT" dirty="0" smtClean="0">
                 <a:solidFill>
                   <a:srgbClr val="C00000"/>
                 </a:solidFill>
@@ -9680,26 +9680,26 @@
               <a:t>end: </a:t>
             </a:r>
             <a:r>
-              <a:rPr lang="it-IT" sz="2000" dirty="0"/>
+              <a:rPr lang="it-IT" dirty="0"/>
               <a:t>a </a:t>
             </a:r>
             <a:r>
-              <a:rPr lang="it-IT" sz="2000" dirty="0" err="1"/>
+              <a:rPr lang="it-IT" dirty="0" err="1"/>
               <a:t>character</a:t>
             </a:r>
             <a:r>
-              <a:rPr lang="it-IT" sz="2000" dirty="0"/>
+              <a:rPr lang="it-IT" dirty="0"/>
               <a:t> </a:t>
             </a:r>
             <a:r>
-              <a:rPr lang="it-IT" sz="2000" dirty="0" err="1"/>
+              <a:rPr lang="it-IT" dirty="0" err="1"/>
               <a:t>string</a:t>
             </a:r>
             <a:r>
-              <a:rPr lang="it-IT" sz="2000" dirty="0"/>
+              <a:rPr lang="it-IT" dirty="0"/>
               <a:t> in the format "YYYY-MM-DD" </a:t>
             </a:r>
-            <a:endParaRPr lang="en-US" sz="2000" dirty="0" smtClean="0">
+            <a:endParaRPr lang="en-US" dirty="0" smtClean="0">
               <a:solidFill>
                 <a:srgbClr val="C00000"/>
               </a:solidFill>
@@ -9707,14 +9707,11 @@
           </a:p>
           <a:p>
             <a:pPr marL="457200" indent="-457200" algn="just">
-              <a:lnSpc>
-                <a:spcPct val="120000"/>
-              </a:lnSpc>
               <a:buFont typeface="Courier New" panose="02070309020205020404" pitchFamily="49" charset="0"/>
               <a:buChar char="o"/>
             </a:pPr>
             <a:r>
-              <a:rPr lang="it-IT" sz="2000" b="1" dirty="0" err="1" smtClean="0">
+              <a:rPr lang="it-IT" b="1" dirty="0" err="1" smtClean="0">
                 <a:solidFill>
                   <a:srgbClr val="C00000"/>
                 </a:solidFill>
@@ -9722,42 +9719,42 @@
               <a:t>ramps</a:t>
             </a:r>
             <a:r>
-              <a:rPr lang="it-IT" sz="2000" dirty="0" smtClean="0"/>
+              <a:rPr lang="it-IT" dirty="0" smtClean="0"/>
               <a:t>: </a:t>
             </a:r>
             <a:r>
-              <a:rPr lang="en-US" sz="2000" dirty="0" smtClean="0"/>
+              <a:rPr lang="en-US" dirty="0" smtClean="0"/>
               <a:t> </a:t>
             </a:r>
             <a:r>
-              <a:rPr lang="en-US" sz="2000" dirty="0"/>
+              <a:rPr lang="en-US" dirty="0"/>
               <a:t>a</a:t>
             </a:r>
             <a:r>
-              <a:rPr lang="en-US" sz="2000" dirty="0" smtClean="0"/>
+              <a:rPr lang="en-US" dirty="0" smtClean="0"/>
               <a:t> </a:t>
             </a:r>
             <a:r>
-              <a:rPr lang="en-US" sz="2000" dirty="0"/>
+              <a:rPr lang="en-US" dirty="0"/>
               <a:t>vector of JSON </a:t>
             </a:r>
             <a:r>
-              <a:rPr lang="en-US" sz="2000" dirty="0" smtClean="0"/>
+              <a:rPr lang="en-US" dirty="0" smtClean="0"/>
               <a:t>elements</a:t>
             </a:r>
             <a:r>
-              <a:rPr lang="en-US" sz="2000" dirty="0"/>
+              <a:rPr lang="en-US" dirty="0"/>
               <a:t>, each </a:t>
             </a:r>
             <a:r>
-              <a:rPr lang="en-US" sz="2000" dirty="0" smtClean="0"/>
+              <a:rPr lang="en-US" dirty="0" smtClean="0"/>
               <a:t>with the </a:t>
             </a:r>
             <a:r>
-              <a:rPr lang="en-US" sz="2000" dirty="0"/>
+              <a:rPr lang="en-US" dirty="0"/>
               <a:t>attributes:</a:t>
             </a:r>
-            <a:endParaRPr lang="it-IT" sz="2000" dirty="0" smtClean="0"/>
+            <a:endParaRPr lang="it-IT" dirty="0" smtClean="0"/>
           </a:p>
           <a:p>
             <a:pPr marL="1371600" lvl="2" indent="-457200" algn="just">
@@ -9768,7 +9765,7 @@
               <a:buChar char="•"/>
             </a:pPr>
             <a:r>
-              <a:rPr lang="it-IT" sz="2000" dirty="0" smtClean="0">
+              <a:rPr lang="it-IT" dirty="0" smtClean="0">
                 <a:solidFill>
                   <a:srgbClr val="C00000"/>
                 </a:solidFill>
@@ -9776,50 +9773,50 @@
               <a:t>start</a:t>
             </a:r>
             <a:r>
-              <a:rPr lang="it-IT" sz="2000" dirty="0"/>
+              <a:rPr lang="it-IT" dirty="0"/>
               <a:t>: a </a:t>
             </a:r>
             <a:r>
-              <a:rPr lang="it-IT" sz="2000" dirty="0" err="1"/>
+              <a:rPr lang="it-IT" dirty="0" err="1"/>
               <a:t>character</a:t>
             </a:r>
             <a:r>
-              <a:rPr lang="it-IT" sz="2000" dirty="0"/>
+              <a:rPr lang="it-IT" dirty="0"/>
               <a:t> </a:t>
             </a:r>
             <a:r>
-              <a:rPr lang="it-IT" sz="2000" dirty="0" err="1"/>
+              <a:rPr lang="it-IT" dirty="0" err="1"/>
               <a:t>string</a:t>
             </a:r>
             <a:r>
-              <a:rPr lang="it-IT" sz="2000" dirty="0"/>
+              <a:rPr lang="it-IT" dirty="0"/>
               <a:t> in the format "YYYY-MM-DD" </a:t>
             </a:r>
             <a:r>
-              <a:rPr lang="it-IT" sz="2000" dirty="0" err="1"/>
+              <a:rPr lang="it-IT" dirty="0" err="1"/>
               <a:t>indicating</a:t>
             </a:r>
             <a:r>
-              <a:rPr lang="it-IT" sz="2000" dirty="0"/>
+              <a:rPr lang="it-IT" dirty="0"/>
               <a:t> the </a:t>
             </a:r>
             <a:r>
-              <a:rPr lang="it-IT" sz="2000" dirty="0" err="1"/>
+              <a:rPr lang="it-IT" dirty="0" err="1"/>
               <a:t>starting</a:t>
             </a:r>
             <a:r>
-              <a:rPr lang="it-IT" sz="2000" dirty="0"/>
+              <a:rPr lang="it-IT" dirty="0"/>
               <a:t> time of the </a:t>
             </a:r>
             <a:r>
-              <a:rPr lang="it-IT" sz="2000" dirty="0" err="1" smtClean="0"/>
+              <a:rPr lang="it-IT" dirty="0" err="1" smtClean="0"/>
               <a:t>ramp</a:t>
             </a:r>
             <a:r>
-              <a:rPr lang="it-IT" sz="2000" dirty="0" smtClean="0"/>
+              <a:rPr lang="it-IT" dirty="0" smtClean="0"/>
               <a:t>;</a:t>
             </a:r>
-            <a:endParaRPr lang="it-IT" sz="2000" dirty="0"/>
+            <a:endParaRPr lang="it-IT" dirty="0"/>
           </a:p>
           <a:p>
             <a:pPr marL="1371600" lvl="2" indent="-457200" algn="just">
@@ -9830,12 +9827,65 @@
               <a:buChar char="•"/>
             </a:pPr>
             <a:r>
-              <a:rPr lang="it-IT" sz="2000" dirty="0" smtClean="0">
+              <a:rPr lang="it-IT" dirty="0" smtClean="0">
                 <a:solidFill>
                   <a:srgbClr val="C00000"/>
                 </a:solidFill>
               </a:rPr>
               <a:t>end</a:t>
+            </a:r>
+            <a:r>
+              <a:rPr lang="it-IT" dirty="0" smtClean="0"/>
+              <a:t>: a </a:t>
+            </a:r>
+            <a:r>
+              <a:rPr lang="it-IT" dirty="0" err="1" smtClean="0"/>
+              <a:t>character</a:t>
+            </a:r>
+            <a:r>
+              <a:rPr lang="it-IT" dirty="0" smtClean="0"/>
+              <a:t> </a:t>
+            </a:r>
+            <a:r>
+              <a:rPr lang="it-IT" dirty="0" err="1" smtClean="0"/>
+              <a:t>string</a:t>
+            </a:r>
+            <a:r>
+              <a:rPr lang="it-IT" dirty="0" smtClean="0"/>
+              <a:t> in the format "YYYY-MM-DD" </a:t>
+            </a:r>
+            <a:r>
+              <a:rPr lang="it-IT" dirty="0" err="1" smtClean="0"/>
+              <a:t>indicating</a:t>
+            </a:r>
+            <a:r>
+              <a:rPr lang="it-IT" dirty="0" smtClean="0"/>
+              <a:t> the end time of the </a:t>
+            </a:r>
+            <a:r>
+              <a:rPr lang="it-IT" dirty="0" err="1" smtClean="0"/>
+              <a:t>ramp</a:t>
+            </a:r>
+            <a:r>
+              <a:rPr lang="it-IT" dirty="0" smtClean="0"/>
+              <a:t>;</a:t>
+            </a:r>
+          </a:p>
+          <a:p>
+            <a:pPr marL="1371600" lvl="2" indent="-457200" algn="just">
+              <a:spcAft>
+                <a:spcPts val="1200"/>
+              </a:spcAft>
+              <a:buFont typeface="Arial" panose="020B0604020202020204" pitchFamily="34" charset="0"/>
+              <a:buChar char="•"/>
+            </a:pPr>
+            <a:r>
+              <a:rPr lang="it-IT" sz="2000" dirty="0" err="1" smtClean="0">
+                <a:solidFill>
+                  <a:srgbClr val="C00000"/>
+                </a:solidFill>
+              </a:rPr>
+              <a:t>fixed_coef</a:t>
             </a:r>
             <a:r>
               <a:rPr lang="it-IT" sz="2000" dirty="0" smtClean="0"/>
@@ -9843,7 +9893,15 @@
             </a:r>
             <a:r>
               <a:rPr lang="it-IT" sz="2000" dirty="0" err="1" smtClean="0"/>
-              <a:t>character</a:t>
+              <a:t>numeric</a:t>
+            </a:r>
+            <a:r>
+              <a:rPr lang="it-IT" sz="2000" dirty="0" smtClean="0"/>
+              <a:t> or a "NA" </a:t>
+            </a:r>
+            <a:r>
+              <a:rPr lang="it-IT" sz="2000" dirty="0" err="1" smtClean="0"/>
+              <a:t>if</a:t>
             </a:r>
             <a:r>
               <a:rPr lang="it-IT" sz="2000" dirty="0" smtClean="0"/>
@@ -9851,29 +9909,13 @@
             </a:r>
             <a:r>
               <a:rPr lang="it-IT" sz="2000" dirty="0" err="1" smtClean="0"/>
-              <a:t>string</a:t>
+              <a:t>not</a:t>
             </a:r>
             <a:r>
               <a:rPr lang="it-IT" sz="2000" dirty="0" smtClean="0"/>
-              <a:t> in the format "YYYY-MM-DD" </a:t>
-            </a:r>
-            <a:r>
-              <a:rPr lang="it-IT" sz="2000" dirty="0" err="1" smtClean="0"/>
-              <a:t>indicating</a:t>
-            </a:r>
-            <a:r>
-              <a:rPr lang="it-IT" sz="2000" dirty="0" smtClean="0"/>
-              <a:t> the end time of the </a:t>
-            </a:r>
-            <a:r>
-              <a:rPr lang="it-IT" sz="2000" dirty="0" err="1" smtClean="0"/>
-              <a:t>ramp</a:t>
-            </a:r>
-            <a:r>
-              <a:rPr lang="it-IT" sz="2000" dirty="0" smtClean="0"/>
-              <a:t>;</a:t>
-            </a:r>
-            <a:endParaRPr lang="it-IT" sz="2300" dirty="0" smtClean="0"/>
+              <a:t> set</a:t>
+            </a:r>
+            <a:endParaRPr lang="it-IT" sz="2000" dirty="0" smtClean="0"/>
           </a:p>
         </p:txBody>
       </p:sp>
@@ -9940,8 +9982,8 @@
         </p:nvSpPr>
         <p:spPr>
           <a:xfrm>
-            <a:off x="415588" y="5795085"/>
-            <a:ext cx="10333928" cy="923330"/>
+            <a:off x="415588" y="5646223"/>
+            <a:ext cx="11546040" cy="1200329"/>
           </a:xfrm>
           <a:prstGeom prst="rect">
             <a:avLst/>
@@ -9986,8 +10028,79 @@
                   <a:schemeClr val="bg1"/>
                 </a:solidFill>
               </a:rPr>
-              <a:t>[{"start":"2020-01-01","end":"2020-12-31"},{"start":"2008-01-01","end":"2009-01-01"}]</a:t>
-            </a:r>
+              <a:t>[{"start":"2020-01-01","end":"2020-12-31</a:t>
+            </a:r>
+            <a:r>
+              <a:rPr lang="it-IT" dirty="0" smtClean="0">
+                <a:solidFill>
+                  <a:schemeClr val="bg1"/>
+                </a:solidFill>
+              </a:rPr>
+              <a:t>", "fixed_</a:t>
+            </a:r>
+            <a:r>
+              <a:rPr lang="it-IT" dirty="0" err="1" smtClean="0">
+                <a:solidFill>
+                  <a:schemeClr val="bg1"/>
+                </a:solidFill>
+              </a:rPr>
+              <a:t>coef</a:t>
+            </a:r>
+            <a:r>
+              <a:rPr lang="it-IT" dirty="0" smtClean="0">
+                <a:solidFill>
+                  <a:schemeClr val="bg1"/>
+                </a:solidFill>
+              </a:rPr>
+              <a:t>":"NA"},</a:t>
+            </a:r>
+          </a:p>
+          <a:p>
+            <a:r>
+              <a:rPr lang="it-IT" dirty="0">
+                <a:solidFill>
+                  <a:schemeClr val="bg1"/>
+                </a:solidFill>
+              </a:rPr>
+              <a:t> </a:t>
+            </a:r>
+            <a:r>
+              <a:rPr lang="it-IT" dirty="0" smtClean="0">
+                <a:solidFill>
+                  <a:schemeClr val="bg1"/>
+                </a:solidFill>
+              </a:rPr>
+              <a:t>                         </a:t>
+            </a:r>
+            <a:r>
+              <a:rPr lang="it-IT" dirty="0" smtClean="0">
+                <a:solidFill>
+                  <a:schemeClr val="bg1"/>
+                </a:solidFill>
+              </a:rPr>
+              <a:t>{"</a:t>
+            </a:r>
+            <a:r>
+              <a:rPr lang="it-IT" dirty="0" smtClean="0">
+                <a:solidFill>
+                  <a:schemeClr val="bg1"/>
+                </a:solidFill>
+              </a:rPr>
+              <a:t>start":"2008-01-01","end":"2009-01-01</a:t>
+            </a:r>
+            <a:r>
+              <a:rPr lang="it-IT" dirty="0" smtClean="0">
+                <a:solidFill>
+                  <a:schemeClr val="bg1"/>
+                </a:solidFill>
+              </a:rPr>
+              <a:t>", "fixed_coef":1}]</a:t>
+            </a:r>
+            <a:endParaRPr lang="it-IT" dirty="0" smtClean="0">
+              <a:solidFill>
+                <a:schemeClr val="bg1"/>
+              </a:solidFill>
+            </a:endParaRPr>
           </a:p>
           <a:p>
             <a:r>
@@ -10065,7 +10178,7 @@
           </a:p>
           <a:p>
             <a:r>
-              <a:rPr lang="it-IT">
+              <a:rPr lang="it-IT" dirty="0">
                 <a:solidFill>
                   <a:schemeClr val="bg1"/>
                 </a:solidFill>
@@ -10073,20 +10186,12 @@
               <a:t> </a:t>
             </a:r>
             <a:r>
-              <a:rPr lang="it-IT" smtClean="0">
+              <a:rPr lang="it-IT" dirty="0" smtClean="0">
                 <a:solidFill>
                   <a:schemeClr val="bg1"/>
                 </a:solidFill>
               </a:rPr>
-              <a:t>                          {"</a:t>
-            </a:r>
-            <a:r>
-              <a:rPr lang="it-IT" dirty="0" smtClean="0">
-                <a:solidFill>
-                  <a:schemeClr val="bg1"/>
-                </a:solidFill>
-              </a:rPr>
-              <a:t>delta":</a:t>
+              <a:t>                          {"delta":</a:t>
             </a:r>
             <a:r>
               <a:rPr lang="it-IT" dirty="0">
@@ -29607,12 +29712,18 @@
 </file>
 
 <file path=customXml/item1.xml><?xml version="1.0" encoding="utf-8"?>
-<?mso-contentType ?>
-<FormTemplates xmlns="http://schemas.microsoft.com/sharepoint/v3/contenttype/forms">
-  <Display>DocumentLibraryForm</Display>
-  <Edit>DocumentLibraryForm</Edit>
-  <New>DocumentLibraryForm</New>
-</FormTemplates>
+<p:properties xmlns:p="http://schemas.microsoft.com/office/2006/metadata/properties" xmlns:xsi="http://www.w3.org/2001/XMLSchema-instance" xmlns:pc="http://schemas.microsoft.com/office/infopath/2007/PartnerControls">
+  <documentManagement>
+    <SottoCategoria xmlns="679261c3-551f-4e86-913f-177e0e529669">-</SottoCategoria>
+    <Categoria xmlns="c58f2efd-82a8-4ecf-b395-8c25e928921d">3- Standard presentazioni Power Point</Categoria>
+    <_dlc_DocId xmlns="459159c4-d20a-4ff3-9b11-fbd127bd52e5">INTRANET-14-174</_dlc_DocId>
+    <_dlc_DocIdUrl xmlns="459159c4-d20a-4ff3-9b11-fbd127bd52e5">
+      <Url>https://intranet.istat.it/Collaborativi/_layouts/15/DocIdRedir.aspx?ID=INTRANET-14-174</Url>
+      <Description>INTRANET-14-174</Description>
+    </_dlc_DocIdUrl>
+    <Ordine xmlns="679261c3-551f-4e86-913f-177e0e529669">1</Ordine>
+  </documentManagement>
+</p:properties>
 </file>
 
 <file path=customXml/item2.xml><?xml version="1.0" encoding="utf-8"?>
@@ -29666,18 +29777,12 @@
 </file>
 
 <file path=customXml/item3.xml><?xml version="1.0" encoding="utf-8"?>
-<p:properties xmlns:p="http://schemas.microsoft.com/office/2006/metadata/properties" xmlns:xsi="http://www.w3.org/2001/XMLSchema-instance" xmlns:pc="http://schemas.microsoft.com/office/infopath/2007/PartnerControls">
-  <documentManagement>
-    <SottoCategoria xmlns="679261c3-551f-4e86-913f-177e0e529669">-</SottoCategoria>
-    <Categoria xmlns="c58f2efd-82a8-4ecf-b395-8c25e928921d">3- Standard presentazioni Power Point</Categoria>
-    <_dlc_DocId xmlns="459159c4-d20a-4ff3-9b11-fbd127bd52e5">INTRANET-14-174</_dlc_DocId>
-    <_dlc_DocIdUrl xmlns="459159c4-d20a-4ff3-9b11-fbd127bd52e5">
-      <Url>https://intranet.istat.it/Collaborativi/_layouts/15/DocIdRedir.aspx?ID=INTRANET-14-174</Url>
-      <Description>INTRANET-14-174</Description>
-    </_dlc_DocIdUrl>
-    <Ordine xmlns="679261c3-551f-4e86-913f-177e0e529669">1</Ordine>
-  </documentManagement>
-</p:properties>
+<?mso-contentType ?>
+<FormTemplates xmlns="http://schemas.microsoft.com/sharepoint/v3/contenttype/forms">
+  <Display>DocumentLibraryForm</Display>
+  <Edit>DocumentLibraryForm</Edit>
+  <New>DocumentLibraryForm</New>
+</FormTemplates>
 </file>
 
 <file path=customXml/item4.xml><?xml version="1.0" encoding="utf-8"?>
@@ -29874,9 +29979,19 @@
 </file>
 
 <file path=customXml/itemProps1.xml><?xml version="1.0" encoding="utf-8"?>
-<ds:datastoreItem xmlns:ds="http://schemas.openxmlformats.org/officeDocument/2006/customXml" ds:itemID="{BD9C238D-4D5C-4783-820B-4854DCE45D41}">
+<ds:datastoreItem xmlns:ds="http://schemas.openxmlformats.org/officeDocument/2006/customXml" ds:itemID="{3EF378BC-F4D0-4510-B4EC-07B6EFE18CF8}">
   <ds:schemaRefs>
-    <ds:schemaRef ds:uri="http://schemas.microsoft.com/sharepoint/v3/contenttype/forms"/>
+    <ds:schemaRef ds:uri="http://schemas.microsoft.com/office/2006/metadata/properties"/>
+    <ds:schemaRef ds:uri="http://www.w3.org/XML/1998/namespace"/>
+    <ds:schemaRef ds:uri="http://schemas.microsoft.com/office/2006/documentManagement/types"/>
+    <ds:schemaRef ds:uri="http://schemas.microsoft.com/office/infopath/2007/PartnerControls"/>
+    <ds:schemaRef ds:uri="http://purl.org/dc/dcmitype/"/>
+    <ds:schemaRef ds:uri="c58f2efd-82a8-4ecf-b395-8c25e928921d"/>
+    <ds:schemaRef ds:uri="http://schemas.openxmlformats.org/package/2006/metadata/core-properties"/>
+    <ds:schemaRef ds:uri="http://purl.org/dc/elements/1.1/"/>
+    <ds:schemaRef ds:uri="679261c3-551f-4e86-913f-177e0e529669"/>
+    <ds:schemaRef ds:uri="459159c4-d20a-4ff3-9b11-fbd127bd52e5"/>
+    <ds:schemaRef ds:uri="http://purl.org/dc/terms/"/>
   </ds:schemaRefs>
 </ds:datastoreItem>
 </file>
@@ -29890,19 +30005,9 @@
 </file>
 
 <file path=customXml/itemProps3.xml><?xml version="1.0" encoding="utf-8"?>
-<ds:datastoreItem xmlns:ds="http://schemas.openxmlformats.org/officeDocument/2006/customXml" ds:itemID="{3EF378BC-F4D0-4510-B4EC-07B6EFE18CF8}">
+<ds:datastoreItem xmlns:ds="http://schemas.openxmlformats.org/officeDocument/2006/customXml" ds:itemID="{BD9C238D-4D5C-4783-820B-4854DCE45D41}">
   <ds:schemaRefs>
-    <ds:schemaRef ds:uri="http://schemas.openxmlformats.org/package/2006/metadata/core-properties"/>
-    <ds:schemaRef ds:uri="http://schemas.microsoft.com/office/2006/documentManagement/types"/>
-    <ds:schemaRef ds:uri="http://www.w3.org/XML/1998/namespace"/>
-    <ds:schemaRef ds:uri="http://purl.org/dc/dcmitype/"/>
-    <ds:schemaRef ds:uri="http://schemas.microsoft.com/office/2006/metadata/properties"/>
-    <ds:schemaRef ds:uri="http://purl.org/dc/elements/1.1/"/>
-    <ds:schemaRef ds:uri="459159c4-d20a-4ff3-9b11-fbd127bd52e5"/>
-    <ds:schemaRef ds:uri="679261c3-551f-4e86-913f-177e0e529669"/>
-    <ds:schemaRef ds:uri="c58f2efd-82a8-4ecf-b395-8c25e928921d"/>
-    <ds:schemaRef ds:uri="http://schemas.microsoft.com/office/infopath/2007/PartnerControls"/>
-    <ds:schemaRef ds:uri="http://purl.org/dc/terms/"/>
+    <ds:schemaRef ds:uri="http://schemas.microsoft.com/sharepoint/v3/contenttype/forms"/>
   </ds:schemaRefs>
 </ds:datastoreItem>
 </file>

</xml_diff>

<commit_message>
Bug fix in Intervention variables
missing D1DS flag and read DeltaDs instead of reading Delta 2 times
</commit_message>
<xml_diff>
--- a/RJDProcessor/doc/package_description/RJDemetra tools for statistical production.pptx
+++ b/RJDProcessor/doc/package_description/RJDemetra tools for statistical production.pptx
@@ -291,7 +291,7 @@
               <a:pPr>
                 <a:defRPr/>
               </a:pPr>
-              <a:t>1/3/2025</a:t>
+              <a:t>1/7/2025</a:t>
             </a:fld>
             <a:endParaRPr lang="en-US"/>
           </a:p>
@@ -9560,8 +9560,62 @@
             </a:r>
             <a:r>
               <a:rPr lang="it-IT" dirty="0" smtClean="0"/>
-              <a:t>;</a:t>
-            </a:r>
+              <a:t>;       </a:t>
+            </a:r>
+            <a:r>
+              <a:rPr lang="it-IT" sz="1400" dirty="0" smtClean="0">
+                <a:solidFill>
+                  <a:srgbClr val="C00000"/>
+                </a:solidFill>
+                <a:sym typeface="Symbol" panose="05050102010706020507" pitchFamily="18" charset="2"/>
+              </a:rPr>
+              <a:t></a:t>
+            </a:r>
+            <a:r>
+              <a:rPr lang="it-IT" dirty="0" smtClean="0"/>
+              <a:t>  </a:t>
+            </a:r>
+            <a:r>
+              <a:rPr lang="it-IT" dirty="0">
+                <a:solidFill>
+                  <a:srgbClr val="C00000"/>
+                </a:solidFill>
+              </a:rPr>
+              <a:t>D1DS</a:t>
+            </a:r>
+            <a:r>
+              <a:rPr lang="it-IT" dirty="0"/>
+              <a:t>:  </a:t>
+            </a:r>
+            <a:r>
+              <a:rPr lang="it-IT" dirty="0" err="1"/>
+              <a:t>boolean</a:t>
+            </a:r>
+            <a:r>
+              <a:rPr lang="it-IT" dirty="0"/>
+              <a:t> </a:t>
+            </a:r>
+            <a:r>
+              <a:rPr lang="it-IT" dirty="0" err="1"/>
+              <a:t>if</a:t>
+            </a:r>
+            <a:r>
+              <a:rPr lang="it-IT" dirty="0"/>
+              <a:t> D1DS mode (</a:t>
+            </a:r>
+            <a:r>
+              <a:rPr lang="it-IT" dirty="0" smtClean="0"/>
+              <a:t>force delta to 1 and </a:t>
+            </a:r>
+            <a:r>
+              <a:rPr lang="it-IT" dirty="0" err="1" smtClean="0"/>
+              <a:t>delta_s</a:t>
+            </a:r>
+            <a:r>
+              <a:rPr lang="it-IT" dirty="0" smtClean="0"/>
+              <a:t> to 0);</a:t>
+            </a:r>
+            <a:endParaRPr lang="it-IT" dirty="0" smtClean="0"/>
           </a:p>
           <a:p>
             <a:pPr marL="1371600" lvl="2" indent="-457200" algn="just">
@@ -9913,7 +9967,11 @@
             </a:r>
             <a:r>
               <a:rPr lang="it-IT" sz="2000" dirty="0" smtClean="0"/>
-              <a:t> set</a:t>
+              <a:t> </a:t>
+            </a:r>
+            <a:r>
+              <a:rPr lang="it-IT" sz="2000" dirty="0" smtClean="0"/>
+              <a:t>set)</a:t>
             </a:r>
             <a:endParaRPr lang="it-IT" sz="2000" dirty="0" smtClean="0"/>
           </a:p>
@@ -10028,7 +10086,15 @@
                   <a:schemeClr val="bg1"/>
                 </a:solidFill>
               </a:rPr>
-              <a:t>[{"start":"2020-01-01","end":"2020-12-31</a:t>
+              <a:t>[{"start":"2020-01-01","end":"2020-12-31", "fixed_</a:t>
+            </a:r>
+            <a:r>
+              <a:rPr lang="it-IT" dirty="0" err="1" smtClean="0">
+                <a:solidFill>
+                  <a:schemeClr val="bg1"/>
+                </a:solidFill>
+              </a:rPr>
+              <a:t>coef</a:t>
             </a:r>
             <a:r>
               <a:rPr lang="it-IT" dirty="0" smtClean="0">
@@ -10036,15 +10102,17 @@
                   <a:schemeClr val="bg1"/>
                 </a:solidFill>
               </a:rPr>
-              <a:t>", "fixed_</a:t>
-            </a:r>
-            <a:r>
-              <a:rPr lang="it-IT" dirty="0" err="1" smtClean="0">
+              <a:t>":"NA"},</a:t>
+            </a:r>
+          </a:p>
+          <a:p>
+            <a:r>
+              <a:rPr lang="it-IT" dirty="0">
                 <a:solidFill>
                   <a:schemeClr val="bg1"/>
                 </a:solidFill>
               </a:rPr>
-              <a:t>coef</a:t>
+              <a:t> </a:t>
             </a:r>
             <a:r>
               <a:rPr lang="it-IT" dirty="0" smtClean="0">
@@ -10052,16 +10120,104 @@
                   <a:schemeClr val="bg1"/>
                 </a:solidFill>
               </a:rPr>
-              <a:t>":"NA"},</a:t>
-            </a:r>
-          </a:p>
-          <a:p>
+              <a:t>                         {"start":"2008-01-01","end":"2009-01-01", "fixed_coef":1}]</a:t>
+            </a:r>
+          </a:p>
+          <a:p>
+            <a:r>
+              <a:rPr lang="it-IT" b="1" dirty="0" smtClean="0">
+                <a:solidFill>
+                  <a:schemeClr val="bg1"/>
+                </a:solidFill>
+              </a:rPr>
+              <a:t>EX. </a:t>
+            </a:r>
+            <a:r>
+              <a:rPr lang="it-IT" b="1" dirty="0">
+                <a:solidFill>
+                  <a:schemeClr val="bg1"/>
+                </a:solidFill>
+              </a:rPr>
+              <a:t>of </a:t>
+            </a:r>
+            <a:r>
+              <a:rPr lang="it-IT" b="1" dirty="0" err="1" smtClean="0">
+                <a:solidFill>
+                  <a:schemeClr val="bg1"/>
+                </a:solidFill>
+              </a:rPr>
+              <a:t>IVs</a:t>
+            </a:r>
+            <a:r>
+              <a:rPr lang="it-IT" b="1" dirty="0" smtClean="0">
+                <a:solidFill>
+                  <a:schemeClr val="bg1"/>
+                </a:solidFill>
+              </a:rPr>
+              <a:t>:</a:t>
+            </a:r>
+            <a:r>
+              <a:rPr lang="it-IT" dirty="0" smtClean="0">
+                <a:solidFill>
+                  <a:schemeClr val="bg1"/>
+                </a:solidFill>
+              </a:rPr>
+              <a:t>        [{"delta":</a:t>
+            </a:r>
             <a:r>
               <a:rPr lang="it-IT" dirty="0">
                 <a:solidFill>
                   <a:schemeClr val="bg1"/>
                 </a:solidFill>
               </a:rPr>
+              <a:t>1</a:t>
+            </a:r>
+            <a:r>
+              <a:rPr lang="it-IT" dirty="0" smtClean="0">
+                <a:solidFill>
+                  <a:schemeClr val="bg1"/>
+                </a:solidFill>
+              </a:rPr>
+              <a:t>,"delta_s":</a:t>
+            </a:r>
+            <a:r>
+              <a:rPr lang="it-IT" dirty="0">
+                <a:solidFill>
+                  <a:schemeClr val="bg1"/>
+                </a:solidFill>
+              </a:rPr>
+              <a:t>1</a:t>
+            </a:r>
+            <a:r>
+              <a:rPr lang="it-IT" dirty="0" smtClean="0">
+                <a:solidFill>
+                  <a:schemeClr val="bg1"/>
+                </a:solidFill>
+              </a:rPr>
+              <a:t>,"seq":[{"start":"2001-01-01","end": "2001-12-31</a:t>
+            </a:r>
+            <a:r>
+              <a:rPr lang="it-IT" dirty="0" smtClean="0">
+                <a:solidFill>
+                  <a:schemeClr val="bg1"/>
+                </a:solidFill>
+              </a:rPr>
+              <a:t>", </a:t>
+            </a:r>
+            <a:r>
+              <a:rPr lang="it-IT" dirty="0" smtClean="0">
+                <a:solidFill>
+                  <a:schemeClr val="bg1"/>
+                </a:solidFill>
+              </a:rPr>
+              <a:t>D1DS: false</a:t>
+            </a:r>
+            <a:r>
+              <a:rPr lang="it-IT" dirty="0" smtClean="0">
+                <a:solidFill>
+                  <a:schemeClr val="bg1"/>
+                </a:solidFill>
+              </a:rPr>
               <a:t> </a:t>
             </a:r>
             <a:r>
@@ -10070,7 +10226,17 @@
                   <a:schemeClr val="bg1"/>
                 </a:solidFill>
               </a:rPr>
-              <a:t>                         </a:t>
+              <a:t>}]}, </a:t>
+            </a:r>
+          </a:p>
+          <a:p>
+            <a:r>
+              <a:rPr lang="it-IT" dirty="0">
+                <a:solidFill>
+                  <a:schemeClr val="bg1"/>
+                </a:solidFill>
+              </a:rPr>
+              <a:t> </a:t>
             </a:r>
             <a:r>
               <a:rPr lang="it-IT" dirty="0" smtClean="0">
@@ -10078,7 +10244,15 @@
                   <a:schemeClr val="bg1"/>
                 </a:solidFill>
               </a:rPr>
-              <a:t>{"</a:t>
+              <a:t>                          {"delta":</a:t>
+            </a:r>
+            <a:r>
+              <a:rPr lang="it-IT" dirty="0">
+                <a:solidFill>
+                  <a:schemeClr val="bg1"/>
+                </a:solidFill>
+              </a:rPr>
+              <a:t>0.75</a:t>
             </a:r>
             <a:r>
               <a:rPr lang="it-IT" dirty="0" smtClean="0">
@@ -10086,7 +10260,15 @@
                   <a:schemeClr val="bg1"/>
                 </a:solidFill>
               </a:rPr>
-              <a:t>start":"2008-01-01","end":"2009-01-01</a:t>
+              <a:t>,"delta_s":</a:t>
+            </a:r>
+            <a:r>
+              <a:rPr lang="it-IT" dirty="0">
+                <a:solidFill>
+                  <a:schemeClr val="bg1"/>
+                </a:solidFill>
+              </a:rPr>
+              <a:t>0</a:t>
             </a:r>
             <a:r>
               <a:rPr lang="it-IT" dirty="0" smtClean="0">
@@ -10094,136 +10276,23 @@
                   <a:schemeClr val="bg1"/>
                 </a:solidFill>
               </a:rPr>
-              <a:t>", "fixed_coef":1}]</a:t>
-            </a:r>
-            <a:endParaRPr lang="it-IT" dirty="0" smtClean="0">
-              <a:solidFill>
-                <a:schemeClr val="bg1"/>
-              </a:solidFill>
-            </a:endParaRPr>
-          </a:p>
-          <a:p>
-            <a:r>
-              <a:rPr lang="it-IT" b="1" dirty="0" smtClean="0">
+              <a:t>,"seq":[{"start":"2004-01-01","end":"</a:t>
+            </a:r>
+            <a:r>
+              <a:rPr lang="it-IT" smtClean="0">
                 <a:solidFill>
                   <a:schemeClr val="bg1"/>
                 </a:solidFill>
               </a:rPr>
-              <a:t>EX. </a:t>
-            </a:r>
-            <a:r>
-              <a:rPr lang="it-IT" b="1" dirty="0">
+              <a:t>2005-12-31</a:t>
+            </a:r>
+            <a:r>
+              <a:rPr lang="it-IT">
                 <a:solidFill>
                   <a:schemeClr val="bg1"/>
                 </a:solidFill>
               </a:rPr>
-              <a:t>of </a:t>
-            </a:r>
-            <a:r>
-              <a:rPr lang="it-IT" b="1" dirty="0" err="1" smtClean="0">
-                <a:solidFill>
-                  <a:schemeClr val="bg1"/>
-                </a:solidFill>
-              </a:rPr>
-              <a:t>IVs</a:t>
-            </a:r>
-            <a:r>
-              <a:rPr lang="it-IT" b="1" dirty="0" smtClean="0">
-                <a:solidFill>
-                  <a:schemeClr val="bg1"/>
-                </a:solidFill>
-              </a:rPr>
-              <a:t>:</a:t>
-            </a:r>
-            <a:r>
-              <a:rPr lang="it-IT" dirty="0" smtClean="0">
-                <a:solidFill>
-                  <a:schemeClr val="bg1"/>
-                </a:solidFill>
-              </a:rPr>
-              <a:t>        [{"delta":</a:t>
-            </a:r>
-            <a:r>
-              <a:rPr lang="it-IT" dirty="0">
-                <a:solidFill>
-                  <a:schemeClr val="bg1"/>
-                </a:solidFill>
-              </a:rPr>
-              <a:t>1</a:t>
-            </a:r>
-            <a:r>
-              <a:rPr lang="it-IT" dirty="0" smtClean="0">
-                <a:solidFill>
-                  <a:schemeClr val="bg1"/>
-                </a:solidFill>
-              </a:rPr>
-              <a:t>,"delta_s":</a:t>
-            </a:r>
-            <a:r>
-              <a:rPr lang="it-IT" dirty="0">
-                <a:solidFill>
-                  <a:schemeClr val="bg1"/>
-                </a:solidFill>
-              </a:rPr>
-              <a:t>1</a:t>
-            </a:r>
-            <a:r>
-              <a:rPr lang="it-IT" dirty="0" smtClean="0">
-                <a:solidFill>
-                  <a:schemeClr val="bg1"/>
-                </a:solidFill>
-              </a:rPr>
-              <a:t>,"seq":[{"start":"2001-01-01","end": "2001-12-31" }]}, </a:t>
-            </a:r>
-          </a:p>
-          <a:p>
-            <a:r>
-              <a:rPr lang="it-IT" dirty="0">
-                <a:solidFill>
-                  <a:schemeClr val="bg1"/>
-                </a:solidFill>
-              </a:rPr>
-              <a:t> </a:t>
-            </a:r>
-            <a:r>
-              <a:rPr lang="it-IT" dirty="0" smtClean="0">
-                <a:solidFill>
-                  <a:schemeClr val="bg1"/>
-                </a:solidFill>
-              </a:rPr>
-              <a:t>                          {"delta":</a:t>
-            </a:r>
-            <a:r>
-              <a:rPr lang="it-IT" dirty="0">
-                <a:solidFill>
-                  <a:schemeClr val="bg1"/>
-                </a:solidFill>
-              </a:rPr>
-              <a:t>0.75</a:t>
-            </a:r>
-            <a:r>
-              <a:rPr lang="it-IT" dirty="0" smtClean="0">
-                <a:solidFill>
-                  <a:schemeClr val="bg1"/>
-                </a:solidFill>
-              </a:rPr>
-              <a:t>,"delta_s":</a:t>
-            </a:r>
-            <a:r>
-              <a:rPr lang="it-IT" dirty="0">
-                <a:solidFill>
-                  <a:schemeClr val="bg1"/>
-                </a:solidFill>
-              </a:rPr>
-              <a:t>0</a:t>
-            </a:r>
-            <a:r>
-              <a:rPr lang="it-IT" dirty="0" smtClean="0">
-                <a:solidFill>
-                  <a:schemeClr val="bg1"/>
-                </a:solidFill>
-              </a:rPr>
-              <a:t>,"seq":[{"start":"2004-01-01","end":"2005-12-31"}]}]</a:t>
+              <a:t>", D1DS: false}]}]</a:t>
             </a:r>
             <a:endParaRPr lang="it-IT" dirty="0">
               <a:solidFill>
@@ -29712,21 +29781,6 @@
 </file>
 
 <file path=customXml/item1.xml><?xml version="1.0" encoding="utf-8"?>
-<p:properties xmlns:p="http://schemas.microsoft.com/office/2006/metadata/properties" xmlns:xsi="http://www.w3.org/2001/XMLSchema-instance" xmlns:pc="http://schemas.microsoft.com/office/infopath/2007/PartnerControls">
-  <documentManagement>
-    <SottoCategoria xmlns="679261c3-551f-4e86-913f-177e0e529669">-</SottoCategoria>
-    <Categoria xmlns="c58f2efd-82a8-4ecf-b395-8c25e928921d">3- Standard presentazioni Power Point</Categoria>
-    <_dlc_DocId xmlns="459159c4-d20a-4ff3-9b11-fbd127bd52e5">INTRANET-14-174</_dlc_DocId>
-    <_dlc_DocIdUrl xmlns="459159c4-d20a-4ff3-9b11-fbd127bd52e5">
-      <Url>https://intranet.istat.it/Collaborativi/_layouts/15/DocIdRedir.aspx?ID=INTRANET-14-174</Url>
-      <Description>INTRANET-14-174</Description>
-    </_dlc_DocIdUrl>
-    <Ordine xmlns="679261c3-551f-4e86-913f-177e0e529669">1</Ordine>
-  </documentManagement>
-</p:properties>
-</file>
-
-<file path=customXml/item2.xml><?xml version="1.0" encoding="utf-8"?>
 <?mso-contentType ?>
 <spe:Receivers xmlns:spe="http://schemas.microsoft.com/sharepoint/events">
   <Receiver>
@@ -29776,16 +29830,22 @@
 </spe:Receivers>
 </file>
 
-<file path=customXml/item3.xml><?xml version="1.0" encoding="utf-8"?>
-<?mso-contentType ?>
-<FormTemplates xmlns="http://schemas.microsoft.com/sharepoint/v3/contenttype/forms">
-  <Display>DocumentLibraryForm</Display>
-  <Edit>DocumentLibraryForm</Edit>
-  <New>DocumentLibraryForm</New>
-</FormTemplates>
+<file path=customXml/item2.xml><?xml version="1.0" encoding="utf-8"?>
+<p:properties xmlns:p="http://schemas.microsoft.com/office/2006/metadata/properties" xmlns:xsi="http://www.w3.org/2001/XMLSchema-instance" xmlns:pc="http://schemas.microsoft.com/office/infopath/2007/PartnerControls">
+  <documentManagement>
+    <SottoCategoria xmlns="679261c3-551f-4e86-913f-177e0e529669">-</SottoCategoria>
+    <Categoria xmlns="c58f2efd-82a8-4ecf-b395-8c25e928921d">3- Standard presentazioni Power Point</Categoria>
+    <_dlc_DocId xmlns="459159c4-d20a-4ff3-9b11-fbd127bd52e5">INTRANET-14-174</_dlc_DocId>
+    <_dlc_DocIdUrl xmlns="459159c4-d20a-4ff3-9b11-fbd127bd52e5">
+      <Url>https://intranet.istat.it/Collaborativi/_layouts/15/DocIdRedir.aspx?ID=INTRANET-14-174</Url>
+      <Description>INTRANET-14-174</Description>
+    </_dlc_DocIdUrl>
+    <Ordine xmlns="679261c3-551f-4e86-913f-177e0e529669">1</Ordine>
+  </documentManagement>
+</p:properties>
 </file>
 
-<file path=customXml/item4.xml><?xml version="1.0" encoding="utf-8"?>
+<file path=customXml/item3.xml><?xml version="1.0" encoding="utf-8"?>
 <ct:contentTypeSchema xmlns:ct="http://schemas.microsoft.com/office/2006/metadata/contentType" xmlns:ma="http://schemas.microsoft.com/office/2006/metadata/properties/metaAttributes" ct:_="" ma:_="" ma:contentTypeName="Documento" ma:contentTypeID="0x010100661A2BE3120D674DA36C11D6006822D4" ma:contentTypeVersion="5" ma:contentTypeDescription="Creare un nuovo documento." ma:contentTypeScope="" ma:versionID="742e6049321d93803bb3bb587f561ffa">
   <xsd:schema xmlns:xsd="http://www.w3.org/2001/XMLSchema" xmlns:xs="http://www.w3.org/2001/XMLSchema" xmlns:p="http://schemas.microsoft.com/office/2006/metadata/properties" xmlns:ns2="c58f2efd-82a8-4ecf-b395-8c25e928921d" xmlns:ns3="459159c4-d20a-4ff3-9b11-fbd127bd52e5" xmlns:ns4="679261c3-551f-4e86-913f-177e0e529669" targetNamespace="http://schemas.microsoft.com/office/2006/metadata/properties" ma:root="true" ma:fieldsID="939ae4a7eaec2950db97a79ca38d2d4d" ns2:_="" ns3:_="" ns4:_="">
     <xsd:import namespace="c58f2efd-82a8-4ecf-b395-8c25e928921d"/>
@@ -29978,7 +30038,24 @@
 </ct:contentTypeSchema>
 </file>
 
+<file path=customXml/item4.xml><?xml version="1.0" encoding="utf-8"?>
+<?mso-contentType ?>
+<FormTemplates xmlns="http://schemas.microsoft.com/sharepoint/v3/contenttype/forms">
+  <Display>DocumentLibraryForm</Display>
+  <Edit>DocumentLibraryForm</Edit>
+  <New>DocumentLibraryForm</New>
+</FormTemplates>
+</file>
+
 <file path=customXml/itemProps1.xml><?xml version="1.0" encoding="utf-8"?>
+<ds:datastoreItem xmlns:ds="http://schemas.openxmlformats.org/officeDocument/2006/customXml" ds:itemID="{D9296C4F-9DE9-4B43-AA80-1FC85656CFFA}">
+  <ds:schemaRefs>
+    <ds:schemaRef ds:uri="http://schemas.microsoft.com/sharepoint/events"/>
+  </ds:schemaRefs>
+</ds:datastoreItem>
+</file>
+
+<file path=customXml/itemProps2.xml><?xml version="1.0" encoding="utf-8"?>
 <ds:datastoreItem xmlns:ds="http://schemas.openxmlformats.org/officeDocument/2006/customXml" ds:itemID="{3EF378BC-F4D0-4510-B4EC-07B6EFE18CF8}">
   <ds:schemaRefs>
     <ds:schemaRef ds:uri="http://schemas.microsoft.com/office/2006/metadata/properties"/>
@@ -29996,23 +30073,7 @@
 </ds:datastoreItem>
 </file>
 
-<file path=customXml/itemProps2.xml><?xml version="1.0" encoding="utf-8"?>
-<ds:datastoreItem xmlns:ds="http://schemas.openxmlformats.org/officeDocument/2006/customXml" ds:itemID="{D9296C4F-9DE9-4B43-AA80-1FC85656CFFA}">
-  <ds:schemaRefs>
-    <ds:schemaRef ds:uri="http://schemas.microsoft.com/sharepoint/events"/>
-  </ds:schemaRefs>
-</ds:datastoreItem>
-</file>
-
 <file path=customXml/itemProps3.xml><?xml version="1.0" encoding="utf-8"?>
-<ds:datastoreItem xmlns:ds="http://schemas.openxmlformats.org/officeDocument/2006/customXml" ds:itemID="{BD9C238D-4D5C-4783-820B-4854DCE45D41}">
-  <ds:schemaRefs>
-    <ds:schemaRef ds:uri="http://schemas.microsoft.com/sharepoint/v3/contenttype/forms"/>
-  </ds:schemaRefs>
-</ds:datastoreItem>
-</file>
-
-<file path=customXml/itemProps4.xml><?xml version="1.0" encoding="utf-8"?>
 <ds:datastoreItem xmlns:ds="http://schemas.openxmlformats.org/officeDocument/2006/customXml" ds:itemID="{AA760D03-2285-4F80-B9FC-1F4F97E97129}">
   <ds:schemaRefs>
     <ds:schemaRef ds:uri="http://schemas.microsoft.com/office/2006/metadata/contentType"/>
@@ -30030,4 +30091,12 @@
     <ds:schemaRef ds:uri="http://schemas.microsoft.com/internal/obd"/>
   </ds:schemaRefs>
 </ds:datastoreItem>
+</file>
+
+<file path=customXml/itemProps4.xml><?xml version="1.0" encoding="utf-8"?>
+<ds:datastoreItem xmlns:ds="http://schemas.openxmlformats.org/officeDocument/2006/customXml" ds:itemID="{BD9C238D-4D5C-4783-820B-4854DCE45D41}">
+  <ds:schemaRefs>
+    <ds:schemaRef ds:uri="http://schemas.microsoft.com/sharepoint/v3/contenttype/forms"/>
+  </ds:schemaRefs>
+</ds:datastoreItem>
 </file>
</xml_diff>

<commit_message>
Update RJDemetra tools for statistical production.pptx
</commit_message>
<xml_diff>
--- a/RJDProcessor/doc/package_description/RJDemetra tools for statistical production.pptx
+++ b/RJDProcessor/doc/package_description/RJDemetra tools for statistical production.pptx
@@ -293,7 +293,7 @@
               <a:pPr>
                 <a:defRPr/>
               </a:pPr>
-              <a:t>4/11/2025</a:t>
+              <a:t>8/9/2025</a:t>
             </a:fld>
             <a:endParaRPr lang="en-US"/>
           </a:p>
@@ -1314,7 +1314,7 @@
               </a:pPr>
               <a:t>19</a:t>
             </a:fld>
-            <a:endParaRPr lang="en-US"/>
+            <a:endParaRPr lang="en-US" dirty="0"/>
           </a:p>
         </p:txBody>
       </p:sp>
@@ -10872,23 +10872,7 @@
                   <a:srgbClr val="C00000"/>
                 </a:solidFill>
               </a:rPr>
-              <a:t> to </a:t>
-            </a:r>
-            <a:r>
-              <a:rPr lang="it-IT" altLang="it-IT" b="0" dirty="0" err="1" smtClean="0">
-                <a:solidFill>
-                  <a:srgbClr val="C00000"/>
-                </a:solidFill>
-              </a:rPr>
-              <a:t>RJDemetra</a:t>
-            </a:r>
-            <a:r>
-              <a:rPr lang="it-IT" altLang="it-IT" b="0" dirty="0" smtClean="0">
-                <a:solidFill>
-                  <a:srgbClr val="C00000"/>
-                </a:solidFill>
-              </a:rPr>
-              <a:t> c("</a:t>
+              <a:t> to RJDemetra c("</a:t>
             </a:r>
             <a:r>
               <a:rPr lang="it-IT" altLang="it-IT" b="0" dirty="0" err="1" smtClean="0">
@@ -11474,12 +11458,8 @@
               <a:t> </a:t>
             </a:r>
             <a:r>
-              <a:rPr lang="it-IT" altLang="it-IT" sz="2400" dirty="0" err="1"/>
-              <a:t>tramoseats_spec</a:t>
-            </a:r>
-            <a:r>
               <a:rPr lang="it-IT" altLang="it-IT" sz="2400" dirty="0"/>
-              <a:t> </a:t>
+              <a:t>tramoseats_spec </a:t>
             </a:r>
             <a:r>
               <a:rPr lang="it-IT" altLang="it-IT" sz="2400" dirty="0" err="1"/>
@@ -11487,15 +11467,7 @@
             </a:r>
             <a:r>
               <a:rPr lang="it-IT" altLang="it-IT" sz="2400" dirty="0"/>
-              <a:t> in </a:t>
-            </a:r>
-            <a:r>
-              <a:rPr lang="it-IT" altLang="it-IT" sz="2400" dirty="0" err="1"/>
-              <a:t>RJDemetra</a:t>
-            </a:r>
-            <a:r>
-              <a:rPr lang="it-IT" altLang="it-IT" sz="2400" dirty="0"/>
-              <a:t> </a:t>
+              <a:t> in RJDemetra </a:t>
             </a:r>
             <a:r>
               <a:rPr lang="it-IT" altLang="it-IT" sz="2400" dirty="0" smtClean="0"/>
@@ -11829,10 +11801,9 @@
               <a:t> by </a:t>
             </a:r>
             <a:r>
-              <a:rPr lang="it-IT" altLang="it-IT" sz="2400" dirty="0" err="1" smtClean="0"/>
+              <a:rPr lang="it-IT" altLang="it-IT" sz="2400" dirty="0" smtClean="0"/>
               <a:t>RJDemetra</a:t>
             </a:r>
-            <a:endParaRPr lang="it-IT" altLang="it-IT" sz="2400" dirty="0" smtClean="0"/>
           </a:p>
           <a:p>
             <a:pPr>
@@ -11905,10 +11876,9 @@
               <a:t> to the </a:t>
             </a:r>
             <a:r>
-              <a:rPr lang="it-IT" altLang="it-IT" sz="2400" dirty="0" err="1" smtClean="0"/>
+              <a:rPr lang="it-IT" altLang="it-IT" sz="2400" dirty="0" smtClean="0"/>
               <a:t>tramoseats_spec</a:t>
             </a:r>
-            <a:endParaRPr lang="it-IT" altLang="it-IT" sz="2400" dirty="0" smtClean="0"/>
           </a:p>
           <a:p>
             <a:pPr>
@@ -14302,15 +14272,7 @@
             </a:r>
             <a:r>
               <a:rPr lang="it-IT" sz="2400" b="1" dirty="0" smtClean="0"/>
-              <a:t>se </a:t>
-            </a:r>
-            <a:r>
-              <a:rPr lang="it-IT" sz="2400" b="1" dirty="0" err="1" smtClean="0"/>
-              <a:t>RJDemetra</a:t>
-            </a:r>
-            <a:r>
-              <a:rPr lang="it-IT" sz="2400" b="1" dirty="0" smtClean="0"/>
-              <a:t> API with </a:t>
+              <a:t>se RJDemetra API with </a:t>
             </a:r>
             <a:r>
               <a:rPr lang="it-IT" sz="2400" b="1" dirty="0" err="1" smtClean="0"/>
@@ -15147,13 +15109,8 @@
           <a:p>
             <a:r>
               <a:rPr lang="it-IT" sz="1600" dirty="0" smtClean="0"/>
-              <a:t>     from </a:t>
-            </a:r>
-            <a:r>
-              <a:rPr lang="it-IT" sz="1600" dirty="0" err="1" smtClean="0"/>
-              <a:t>RJDemetra</a:t>
-            </a:r>
-            <a:endParaRPr lang="it-IT" sz="1600" dirty="0" smtClean="0"/>
+              <a:t>     from RJDemetra</a:t>
+            </a:r>
           </a:p>
           <a:p>
             <a:pPr marL="285750" indent="-285750">
@@ -15536,11 +15493,7 @@
             </a:r>
             <a:r>
               <a:rPr lang="it-IT" dirty="0" smtClean="0"/>
-              <a:t> with </a:t>
-            </a:r>
-            <a:r>
-              <a:rPr lang="it-IT" dirty="0" err="1" smtClean="0"/>
-              <a:t>RJDemetra</a:t>
+              <a:t> with RJDemetra</a:t>
             </a:r>
             <a:endParaRPr lang="it-IT" dirty="0"/>
           </a:p>
@@ -15754,12 +15707,8 @@
               <a:buChar char="•"/>
             </a:pPr>
             <a:r>
-              <a:rPr lang="it-IT" sz="1400" dirty="0" err="1" smtClean="0"/>
-              <a:t>JD_JSON_file_processor</a:t>
-            </a:r>
-            <a:r>
               <a:rPr lang="it-IT" sz="1400" dirty="0" smtClean="0"/>
-              <a:t> (</a:t>
+              <a:t>JD_JSON_file_processor (</a:t>
             </a:r>
             <a:r>
               <a:rPr lang="it-IT" sz="1400" dirty="0" err="1" smtClean="0"/>
@@ -15900,7 +15849,7 @@
           <a:lstStyle/>
           <a:p>
             <a:pPr algn="ctr"/>
-            <a:endParaRPr lang="it-IT" sz="1600"/>
+            <a:endParaRPr lang="it-IT" sz="1600" dirty="0"/>
           </a:p>
         </p:txBody>
       </p:sp>
@@ -15937,23 +15886,7 @@
                   <a:srgbClr val="C00000"/>
                 </a:solidFill>
               </a:rPr>
-              <a:t>Full </a:t>
-            </a:r>
-            <a:r>
-              <a:rPr lang="en-US" sz="3200" dirty="0" err="1" smtClean="0">
-                <a:solidFill>
-                  <a:srgbClr val="C00000"/>
-                </a:solidFill>
-              </a:rPr>
-              <a:t>JDProcessor</a:t>
-            </a:r>
-            <a:r>
-              <a:rPr lang="en-US" sz="3200" dirty="0" smtClean="0">
-                <a:solidFill>
-                  <a:srgbClr val="C00000"/>
-                </a:solidFill>
-              </a:rPr>
-              <a:t> Stack + possible extensions(*)</a:t>
+              <a:t>Full JDProcessor Stack + possible extensions(*)</a:t>
             </a:r>
             <a:endParaRPr lang="it-IT" sz="3200" b="0" dirty="0">
               <a:solidFill>
@@ -16063,7 +15996,7 @@
           <a:lstStyle/>
           <a:p>
             <a:pPr algn="ctr"/>
-            <a:endParaRPr lang="it-IT" sz="1600"/>
+            <a:endParaRPr lang="it-IT" sz="1600" dirty="0"/>
           </a:p>
         </p:txBody>
       </p:sp>
@@ -16112,7 +16045,7 @@
           <a:lstStyle/>
           <a:p>
             <a:pPr algn="ctr"/>
-            <a:endParaRPr lang="it-IT" sz="1600"/>
+            <a:endParaRPr lang="it-IT" sz="1600" dirty="0"/>
           </a:p>
         </p:txBody>
       </p:sp>
@@ -16185,7 +16118,7 @@
           <a:lstStyle/>
           <a:p>
             <a:pPr algn="ctr"/>
-            <a:endParaRPr lang="it-IT" sz="1600"/>
+            <a:endParaRPr lang="it-IT" sz="1600" dirty="0"/>
           </a:p>
         </p:txBody>
       </p:sp>
@@ -16265,57 +16198,7 @@
           <a:lstStyle/>
           <a:p>
             <a:pPr algn="ctr"/>
-            <a:endParaRPr lang="it-IT" sz="1600"/>
-          </a:p>
-        </p:txBody>
-      </p:sp>
-      <p:sp>
-        <p:nvSpPr>
-          <p:cNvPr id="27" name="CasellaDiTesto 26"/>
-          <p:cNvSpPr txBox="1"/>
-          <p:nvPr/>
-        </p:nvSpPr>
-        <p:spPr>
-          <a:xfrm>
-            <a:off x="4845284" y="5120499"/>
-            <a:ext cx="2400300" cy="369332"/>
-          </a:xfrm>
-          <a:prstGeom prst="rect">
-            <a:avLst/>
-          </a:prstGeom>
-          <a:noFill/>
-        </p:spPr>
-        <p:txBody>
-          <a:bodyPr wrap="square" rtlCol="0">
-            <a:spAutoFit/>
-          </a:bodyPr>
-          <a:lstStyle/>
-          <a:p>
-            <a:pPr algn="ctr"/>
-            <a:r>
-              <a:rPr lang="it-IT" b="1" dirty="0" err="1" smtClean="0">
-                <a:solidFill>
-                  <a:srgbClr val="C00000"/>
-                </a:solidFill>
-              </a:rPr>
-              <a:t>R+RJDemetra</a:t>
-            </a:r>
-            <a:r>
-              <a:rPr lang="it-IT" b="1" dirty="0" smtClean="0">
-                <a:solidFill>
-                  <a:srgbClr val="C00000"/>
-                </a:solidFill>
-              </a:rPr>
-              <a:t>/rjd3</a:t>
-            </a:r>
-            <a:r>
-              <a:rPr lang="it-IT" b="1" dirty="0" smtClean="0">
-                <a:solidFill>
-                  <a:srgbClr val="C00000"/>
-                </a:solidFill>
-              </a:rPr>
-              <a:t>*</a:t>
-            </a:r>
+            <a:endParaRPr lang="it-IT" sz="1600" dirty="0"/>
           </a:p>
         </p:txBody>
       </p:sp>
@@ -16361,7 +16244,7 @@
           <a:lstStyle/>
           <a:p>
             <a:pPr algn="ctr"/>
-            <a:endParaRPr lang="it-IT" sz="1600"/>
+            <a:endParaRPr lang="it-IT" sz="1600" dirty="0"/>
           </a:p>
         </p:txBody>
       </p:sp>
@@ -16526,7 +16409,7 @@
           <a:p>
             <a:pPr algn="ctr"/>
             <a:r>
-              <a:rPr lang="it-IT" b="1" dirty="0" err="1">
+              <a:rPr lang="it-IT" b="1" dirty="0">
                 <a:solidFill>
                   <a:srgbClr val="C00000"/>
                 </a:solidFill>
@@ -16534,18 +16417,13 @@
               <a:t>t</a:t>
             </a:r>
             <a:r>
-              <a:rPr lang="it-IT" b="1" dirty="0" err="1" smtClean="0">
+              <a:rPr lang="it-IT" b="1" dirty="0" smtClean="0">
                 <a:solidFill>
                   <a:srgbClr val="C00000"/>
                 </a:solidFill>
               </a:rPr>
               <a:t>ramoseats_spec</a:t>
             </a:r>
-            <a:endParaRPr lang="it-IT" b="1" dirty="0" smtClean="0">
-              <a:solidFill>
-                <a:srgbClr val="C00000"/>
-              </a:solidFill>
-            </a:endParaRPr>
           </a:p>
         </p:txBody>
       </p:sp>
@@ -16589,7 +16467,7 @@
           <a:lstStyle/>
           <a:p>
             <a:pPr algn="ctr"/>
-            <a:endParaRPr lang="it-IT" sz="1600"/>
+            <a:endParaRPr lang="it-IT" sz="1600" dirty="0"/>
           </a:p>
         </p:txBody>
       </p:sp>
@@ -16635,11 +16513,6 @@
               </a:rPr>
               <a:t>X13_spec*</a:t>
             </a:r>
-            <a:endParaRPr lang="it-IT" b="1" dirty="0" smtClean="0">
-              <a:solidFill>
-                <a:srgbClr val="0070C0"/>
-              </a:solidFill>
-            </a:endParaRPr>
           </a:p>
         </p:txBody>
       </p:sp>
@@ -16688,7 +16561,7 @@
           <a:lstStyle/>
           <a:p>
             <a:pPr algn="ctr"/>
-            <a:endParaRPr lang="it-IT" sz="1600"/>
+            <a:endParaRPr lang="it-IT" sz="1600" dirty="0"/>
           </a:p>
         </p:txBody>
       </p:sp>
@@ -16737,7 +16610,7 @@
           <a:lstStyle/>
           <a:p>
             <a:pPr algn="ctr"/>
-            <a:endParaRPr lang="it-IT" sz="1600"/>
+            <a:endParaRPr lang="it-IT" sz="1600" dirty="0"/>
           </a:p>
         </p:txBody>
       </p:sp>
@@ -16894,23 +16767,7 @@
                   <a:schemeClr val="bg1"/>
                 </a:solidFill>
               </a:rPr>
-              <a:t>Orchestrator (</a:t>
-            </a:r>
-            <a:r>
-              <a:rPr lang="it-IT" b="1" dirty="0" err="1" smtClean="0">
-                <a:solidFill>
-                  <a:schemeClr val="bg1"/>
-                </a:solidFill>
-              </a:rPr>
-              <a:t>User's</a:t>
-            </a:r>
-            <a:r>
-              <a:rPr lang="it-IT" b="1" dirty="0" smtClean="0">
-                <a:solidFill>
-                  <a:schemeClr val="bg1"/>
-                </a:solidFill>
-              </a:rPr>
-              <a:t> R script)</a:t>
+              <a:t>Orchestrator (User's R script)</a:t>
             </a:r>
           </a:p>
         </p:txBody>
@@ -16957,7 +16814,7 @@
           <a:lstStyle/>
           <a:p>
             <a:pPr algn="ctr"/>
-            <a:endParaRPr lang="it-IT" sz="1600"/>
+            <a:endParaRPr lang="it-IT" sz="1600" dirty="0"/>
           </a:p>
         </p:txBody>
       </p:sp>
@@ -17003,7 +16860,7 @@
           <a:lstStyle/>
           <a:p>
             <a:pPr algn="ctr"/>
-            <a:endParaRPr lang="it-IT" sz="1600"/>
+            <a:endParaRPr lang="it-IT" sz="1600" dirty="0"/>
           </a:p>
         </p:txBody>
       </p:sp>
@@ -17031,40 +16888,12 @@
           <a:p>
             <a:pPr algn="ctr"/>
             <a:r>
-              <a:rPr lang="it-IT" b="1" dirty="0" err="1" smtClean="0"/>
-              <a:t>Notation</a:t>
-            </a:r>
-            <a:r>
               <a:rPr lang="it-IT" b="1" dirty="0" smtClean="0"/>
-              <a:t>:</a:t>
+              <a:t>Notation:</a:t>
             </a:r>
             <a:r>
               <a:rPr lang="it-IT" dirty="0" smtClean="0"/>
-              <a:t> </a:t>
-            </a:r>
-            <a:r>
-              <a:rPr lang="it-IT" dirty="0" err="1" smtClean="0"/>
-              <a:t>when</a:t>
-            </a:r>
-            <a:r>
-              <a:rPr lang="it-IT" dirty="0" smtClean="0"/>
-              <a:t> a </a:t>
-            </a:r>
-            <a:r>
-              <a:rPr lang="it-IT" dirty="0" err="1" smtClean="0"/>
-              <a:t>block</a:t>
-            </a:r>
-            <a:r>
-              <a:rPr lang="it-IT" dirty="0" smtClean="0"/>
-              <a:t> </a:t>
-            </a:r>
-            <a:r>
-              <a:rPr lang="it-IT" dirty="0" err="1" smtClean="0"/>
-              <a:t>lies</a:t>
-            </a:r>
-            <a:r>
-              <a:rPr lang="it-IT" dirty="0" smtClean="0"/>
-              <a:t> </a:t>
+              <a:t> when a block lies </a:t>
             </a:r>
             <a:r>
               <a:rPr lang="en-US" dirty="0"/>
@@ -17212,7 +17041,7 @@
           <a:lstStyle/>
           <a:p>
             <a:pPr algn="ctr"/>
-            <a:endParaRPr lang="it-IT" sz="1600"/>
+            <a:endParaRPr lang="it-IT" sz="1600" dirty="0"/>
           </a:p>
         </p:txBody>
       </p:sp>
@@ -17286,18 +17115,13 @@
           <a:p>
             <a:pPr algn="ctr"/>
             <a:r>
-              <a:rPr lang="it-IT" b="1" dirty="0" err="1" smtClean="0">
+              <a:rPr lang="it-IT" b="1" dirty="0" smtClean="0">
                 <a:solidFill>
                   <a:srgbClr val="C00000"/>
                 </a:solidFill>
               </a:rPr>
               <a:t>JD_JSON_file_processor</a:t>
             </a:r>
-            <a:endParaRPr lang="it-IT" b="1" dirty="0" smtClean="0">
-              <a:solidFill>
-                <a:srgbClr val="C00000"/>
-              </a:solidFill>
-            </a:endParaRPr>
           </a:p>
         </p:txBody>
       </p:sp>
@@ -17309,8 +17133,8 @@
         </p:nvSpPr>
         <p:spPr>
           <a:xfrm>
-            <a:off x="5809914" y="2540161"/>
-            <a:ext cx="2575697" cy="695186"/>
+            <a:off x="5809914" y="2521872"/>
+            <a:ext cx="2575697" cy="712442"/>
           </a:xfrm>
           <a:prstGeom prst="rect">
             <a:avLst/>
@@ -17371,18 +17195,13 @@
           <a:p>
             <a:pPr algn="ctr"/>
             <a:r>
-              <a:rPr lang="it-IT" b="1" dirty="0" err="1" smtClean="0">
+              <a:rPr lang="it-IT" b="1" dirty="0" smtClean="0">
                 <a:solidFill>
                   <a:srgbClr val="C00000"/>
                 </a:solidFill>
               </a:rPr>
               <a:t>Workspace_manager</a:t>
             </a:r>
-            <a:endParaRPr lang="it-IT" b="1" dirty="0" smtClean="0">
-              <a:solidFill>
-                <a:srgbClr val="C00000"/>
-              </a:solidFill>
-            </a:endParaRPr>
           </a:p>
         </p:txBody>
       </p:sp>
@@ -17394,8 +17213,8 @@
         </p:nvSpPr>
         <p:spPr>
           <a:xfrm>
-            <a:off x="8386281" y="2534040"/>
-            <a:ext cx="1866184" cy="695186"/>
+            <a:off x="8386281" y="2524895"/>
+            <a:ext cx="1866184" cy="709419"/>
           </a:xfrm>
           <a:prstGeom prst="rect">
             <a:avLst/>
@@ -17437,6 +17256,69 @@
               <a:t>Reports</a:t>
             </a:r>
             <a:endParaRPr lang="it-IT" sz="1600" b="1" dirty="0">
+              <a:solidFill>
+                <a:srgbClr val="C00000"/>
+              </a:solidFill>
+            </a:endParaRPr>
+          </a:p>
+        </p:txBody>
+      </p:sp>
+      <p:sp>
+        <p:nvSpPr>
+          <p:cNvPr id="27" name="CasellaDiTesto 26"/>
+          <p:cNvSpPr txBox="1"/>
+          <p:nvPr/>
+        </p:nvSpPr>
+        <p:spPr>
+          <a:xfrm>
+            <a:off x="3880126" y="5082039"/>
+            <a:ext cx="4330615" cy="369332"/>
+          </a:xfrm>
+          <a:prstGeom prst="rect">
+            <a:avLst/>
+          </a:prstGeom>
+          <a:noFill/>
+        </p:spPr>
+        <p:txBody>
+          <a:bodyPr wrap="square" rtlCol="0">
+            <a:spAutoFit/>
+          </a:bodyPr>
+          <a:lstStyle/>
+          <a:p>
+            <a:pPr algn="ctr"/>
+            <a:r>
+              <a:rPr lang="it-IT" b="1" dirty="0" err="1" smtClean="0">
+                <a:solidFill>
+                  <a:srgbClr val="C00000"/>
+                </a:solidFill>
+              </a:rPr>
+              <a:t>RJDemetra</a:t>
+            </a:r>
+            <a:r>
+              <a:rPr lang="it-IT" b="1" dirty="0" smtClean="0">
+                <a:solidFill>
+                  <a:srgbClr val="C00000"/>
+                </a:solidFill>
+              </a:rPr>
+              <a:t>/rjd3</a:t>
+            </a:r>
+            <a:r>
+              <a:rPr lang="it-IT" b="1" dirty="0" smtClean="0">
+                <a:solidFill>
+                  <a:srgbClr val="C00000"/>
+                </a:solidFill>
+              </a:rPr>
+              <a:t>* + </a:t>
+            </a:r>
+            <a:r>
+              <a:rPr lang="it-IT" b="1" dirty="0" err="1" smtClean="0">
+                <a:solidFill>
+                  <a:srgbClr val="C00000"/>
+                </a:solidFill>
+              </a:rPr>
+              <a:t>rJava</a:t>
+            </a:r>
+            <a:endParaRPr lang="it-IT" b="1" dirty="0" smtClean="0">
               <a:solidFill>
                 <a:srgbClr val="C00000"/>
               </a:solidFill>
@@ -18112,7 +17994,7 @@
           <a:lstStyle/>
           <a:p>
             <a:pPr algn="ctr"/>
-            <a:endParaRPr lang="it-IT" sz="1600"/>
+            <a:endParaRPr lang="it-IT" sz="1600" dirty="0"/>
           </a:p>
         </p:txBody>
       </p:sp>
@@ -18149,23 +18031,7 @@
                   <a:srgbClr val="C00000"/>
                 </a:solidFill>
               </a:rPr>
-              <a:t>Full </a:t>
-            </a:r>
-            <a:r>
-              <a:rPr lang="en-US" sz="3200" dirty="0" err="1" smtClean="0">
-                <a:solidFill>
-                  <a:srgbClr val="C00000"/>
-                </a:solidFill>
-              </a:rPr>
-              <a:t>JDProcessor</a:t>
-            </a:r>
-            <a:r>
-              <a:rPr lang="en-US" sz="3200" dirty="0" smtClean="0">
-                <a:solidFill>
-                  <a:srgbClr val="C00000"/>
-                </a:solidFill>
-              </a:rPr>
-              <a:t> Stack + possible extensions(*)</a:t>
+              <a:t>Full JDProcessor Stack + possible extensions(*)</a:t>
             </a:r>
             <a:endParaRPr lang="it-IT" sz="3200" b="0" dirty="0">
               <a:solidFill>
@@ -18275,7 +18141,7 @@
           <a:lstStyle/>
           <a:p>
             <a:pPr algn="ctr"/>
-            <a:endParaRPr lang="it-IT" sz="1600"/>
+            <a:endParaRPr lang="it-IT" sz="1600" dirty="0"/>
           </a:p>
         </p:txBody>
       </p:sp>
@@ -18324,7 +18190,7 @@
           <a:lstStyle/>
           <a:p>
             <a:pPr algn="ctr"/>
-            <a:endParaRPr lang="it-IT" sz="1600"/>
+            <a:endParaRPr lang="it-IT" sz="1600" dirty="0"/>
           </a:p>
         </p:txBody>
       </p:sp>
@@ -18397,7 +18263,7 @@
           <a:lstStyle/>
           <a:p>
             <a:pPr algn="ctr"/>
-            <a:endParaRPr lang="it-IT" sz="1600"/>
+            <a:endParaRPr lang="it-IT" sz="1600" dirty="0"/>
           </a:p>
         </p:txBody>
       </p:sp>
@@ -18477,7 +18343,7 @@
           <a:lstStyle/>
           <a:p>
             <a:pPr algn="ctr"/>
-            <a:endParaRPr lang="it-IT" sz="1600"/>
+            <a:endParaRPr lang="it-IT" sz="1600" dirty="0"/>
           </a:p>
         </p:txBody>
       </p:sp>
@@ -18523,7 +18389,7 @@
           <a:lstStyle/>
           <a:p>
             <a:pPr algn="ctr"/>
-            <a:endParaRPr lang="it-IT" sz="1600"/>
+            <a:endParaRPr lang="it-IT" sz="1600" dirty="0"/>
           </a:p>
         </p:txBody>
       </p:sp>
@@ -18659,7 +18525,7 @@
           <a:lstStyle/>
           <a:p>
             <a:pPr algn="ctr"/>
-            <a:endParaRPr lang="it-IT" sz="1600"/>
+            <a:endParaRPr lang="it-IT" sz="1600" dirty="0"/>
           </a:p>
         </p:txBody>
       </p:sp>
@@ -18708,7 +18574,7 @@
           <a:lstStyle/>
           <a:p>
             <a:pPr algn="ctr"/>
-            <a:endParaRPr lang="it-IT" sz="1600"/>
+            <a:endParaRPr lang="it-IT" sz="1600" dirty="0"/>
           </a:p>
         </p:txBody>
       </p:sp>
@@ -18757,7 +18623,7 @@
           <a:lstStyle/>
           <a:p>
             <a:pPr algn="ctr"/>
-            <a:endParaRPr lang="it-IT" sz="1600"/>
+            <a:endParaRPr lang="it-IT" sz="1600" dirty="0"/>
           </a:p>
         </p:txBody>
       </p:sp>
@@ -18880,23 +18746,7 @@
                   <a:schemeClr val="bg1"/>
                 </a:solidFill>
               </a:rPr>
-              <a:t>Orchestrator (</a:t>
-            </a:r>
-            <a:r>
-              <a:rPr lang="it-IT" b="1" dirty="0" err="1" smtClean="0">
-                <a:solidFill>
-                  <a:schemeClr val="bg1"/>
-                </a:solidFill>
-              </a:rPr>
-              <a:t>User's</a:t>
-            </a:r>
-            <a:r>
-              <a:rPr lang="it-IT" b="1" dirty="0" smtClean="0">
-                <a:solidFill>
-                  <a:schemeClr val="bg1"/>
-                </a:solidFill>
-              </a:rPr>
-              <a:t> R script)</a:t>
+              <a:t>Orchestrator (User's R script)</a:t>
             </a:r>
           </a:p>
         </p:txBody>
@@ -18943,7 +18793,7 @@
           <a:lstStyle/>
           <a:p>
             <a:pPr algn="ctr"/>
-            <a:endParaRPr lang="it-IT" sz="1600"/>
+            <a:endParaRPr lang="it-IT" sz="1600" dirty="0"/>
           </a:p>
         </p:txBody>
       </p:sp>
@@ -18989,7 +18839,7 @@
           <a:lstStyle/>
           <a:p>
             <a:pPr algn="ctr"/>
-            <a:endParaRPr lang="it-IT" sz="1600"/>
+            <a:endParaRPr lang="it-IT" sz="1600" dirty="0"/>
           </a:p>
         </p:txBody>
       </p:sp>
@@ -19038,15 +18888,7 @@
             </a:r>
             <a:r>
               <a:rPr lang="it-IT" b="1" dirty="0" smtClean="0"/>
-              <a:t>: </a:t>
-            </a:r>
-            <a:r>
-              <a:rPr lang="it-IT" b="1" dirty="0" err="1" smtClean="0"/>
-              <a:t>RJDemetra</a:t>
-            </a:r>
-            <a:r>
-              <a:rPr lang="it-IT" b="1" dirty="0" smtClean="0"/>
-              <a:t>, rjd3providers, </a:t>
+              <a:t>: RJDemetra, rjd3providers, </a:t>
             </a:r>
             <a:r>
               <a:rPr lang="it-IT" b="1" dirty="0" err="1" smtClean="0"/>
@@ -19065,7 +18907,7 @@
               <a:t>, </a:t>
             </a:r>
             <a:r>
-              <a:rPr lang="it-IT" b="1" smtClean="0"/>
+              <a:rPr lang="it-IT" b="1" dirty="0" err="1" smtClean="0"/>
               <a:t>rjdqa</a:t>
             </a:r>
             <a:endParaRPr lang="it-IT" dirty="0" smtClean="0"/>
@@ -19810,15 +19652,7 @@
             </a:pPr>
             <a:r>
               <a:rPr lang="en-US" sz="2400" dirty="0"/>
-              <a:t>To utilize </a:t>
-            </a:r>
-            <a:r>
-              <a:rPr lang="en-US" sz="2400" dirty="0" err="1"/>
-              <a:t>JDProcessor</a:t>
-            </a:r>
-            <a:r>
-              <a:rPr lang="en-US" sz="2400" dirty="0"/>
-              <a:t> in your environment, simply </a:t>
+              <a:t>To utilize JDProcessor in your environment, simply </a:t>
             </a:r>
             <a:r>
               <a:rPr lang="en-US" sz="2400" b="1" dirty="0">
@@ -22198,18 +22032,13 @@
           <a:p>
             <a:pPr algn="ctr"/>
             <a:r>
-              <a:rPr lang="it-IT" sz="2000" b="1" dirty="0" err="1" smtClean="0">
+              <a:rPr lang="it-IT" sz="2000" b="1" dirty="0" smtClean="0">
                 <a:solidFill>
                   <a:srgbClr val="C00000"/>
                 </a:solidFill>
               </a:rPr>
               <a:t>JD_JSON_file_processor</a:t>
             </a:r>
-            <a:endParaRPr lang="it-IT" sz="2000" b="1" dirty="0" smtClean="0">
-              <a:solidFill>
-                <a:srgbClr val="C00000"/>
-              </a:solidFill>
-            </a:endParaRPr>
           </a:p>
         </p:txBody>
       </p:sp>
@@ -24592,20 +24421,12 @@
           <a:p>
             <a:pPr algn="ctr"/>
             <a:r>
-              <a:rPr lang="it-IT" sz="2800" b="1" dirty="0" err="1" smtClean="0">
+              <a:rPr lang="it-IT" sz="2800" b="1" dirty="0" smtClean="0">
                 <a:solidFill>
                   <a:srgbClr val="C00000"/>
                 </a:solidFill>
               </a:rPr>
-              <a:t>RJDemetra</a:t>
-            </a:r>
-            <a:r>
-              <a:rPr lang="it-IT" sz="2800" b="1" dirty="0" smtClean="0">
-                <a:solidFill>
-                  <a:srgbClr val="C00000"/>
-                </a:solidFill>
-              </a:rPr>
-              <a:t>_</a:t>
+              <a:t>RJDemetra_</a:t>
             </a:r>
           </a:p>
           <a:p>
@@ -25121,17 +24942,10 @@
                 <a:latin typeface="Courier New" panose="02070309020205020404" pitchFamily="49" charset="0"/>
                 <a:cs typeface="Courier New" panose="02070309020205020404" pitchFamily="49" charset="0"/>
               </a:rPr>
-              <a:t>   </a:t>
-            </a:r>
-            <a:r>
-              <a:rPr lang="it-IT" smtClean="0">
-                <a:latin typeface="Courier New" panose="02070309020205020404" pitchFamily="49" charset="0"/>
-                <a:cs typeface="Courier New" panose="02070309020205020404" pitchFamily="49" charset="0"/>
-              </a:rPr>
-              <a:t>&lt;- </a:t>
-            </a:r>
-            <a:r>
-              <a:rPr lang="it-IT" smtClean="0">
+              <a:t>   &lt;- </a:t>
+            </a:r>
+            <a:r>
+              <a:rPr lang="it-IT" dirty="0" smtClean="0">
                 <a:solidFill>
                   <a:srgbClr val="00B0F0"/>
                 </a:solidFill>
@@ -25696,27 +25510,7 @@
                 <a:latin typeface="Courier New" panose="02070309020205020404" pitchFamily="49" charset="0"/>
                 <a:cs typeface="Courier New" panose="02070309020205020404" pitchFamily="49" charset="0"/>
               </a:rPr>
-              <a:t>#</a:t>
-            </a:r>
-            <a:r>
-              <a:rPr lang="it-IT" dirty="0" err="1" smtClean="0">
-                <a:solidFill>
-                  <a:srgbClr val="00CC99"/>
-                </a:solidFill>
-                <a:latin typeface="Courier New" panose="02070309020205020404" pitchFamily="49" charset="0"/>
-                <a:cs typeface="Courier New" panose="02070309020205020404" pitchFamily="49" charset="0"/>
-              </a:rPr>
-              <a:t>RJDemetra</a:t>
-            </a:r>
-            <a:r>
-              <a:rPr lang="it-IT" dirty="0" smtClean="0">
-                <a:solidFill>
-                  <a:srgbClr val="00CC99"/>
-                </a:solidFill>
-                <a:latin typeface="Courier New" panose="02070309020205020404" pitchFamily="49" charset="0"/>
-                <a:cs typeface="Courier New" panose="02070309020205020404" pitchFamily="49" charset="0"/>
-              </a:rPr>
-              <a:t> </a:t>
+              <a:t>#RJDemetra </a:t>
             </a:r>
             <a:r>
               <a:rPr lang="it-IT" dirty="0" err="1" smtClean="0">
@@ -26908,15 +26702,7 @@
                   <a:srgbClr val="C00000"/>
                 </a:solidFill>
               </a:rPr>
-              <a:t>+ and </a:t>
-            </a:r>
-            <a:r>
-              <a:rPr lang="it-IT" sz="3600" dirty="0" err="1" smtClean="0">
-                <a:solidFill>
-                  <a:srgbClr val="C00000"/>
-                </a:solidFill>
-              </a:rPr>
-              <a:t>RJDemetra</a:t>
+              <a:t>+ and RJDemetra</a:t>
             </a:r>
             <a:endParaRPr lang="it-IT" sz="3600" dirty="0">
               <a:solidFill>
@@ -27238,23 +27024,7 @@
                   <a:schemeClr val="tx1"/>
                 </a:solidFill>
               </a:rPr>
-              <a:t> </a:t>
-            </a:r>
-            <a:r>
-              <a:rPr lang="it-IT" sz="2800" b="0" dirty="0" err="1" smtClean="0">
-                <a:solidFill>
-                  <a:schemeClr val="tx1"/>
-                </a:solidFill>
-              </a:rPr>
-              <a:t>RJDemetra</a:t>
-            </a:r>
-            <a:r>
-              <a:rPr lang="it-IT" sz="2800" b="0" dirty="0" smtClean="0">
-                <a:solidFill>
-                  <a:schemeClr val="tx1"/>
-                </a:solidFill>
-              </a:rPr>
-              <a:t> and rjd3)</a:t>
+              <a:t> RJDemetra and rjd3)</a:t>
             </a:r>
             <a:r>
               <a:rPr lang="it-IT" sz="2800" b="0" dirty="0" smtClean="0">
@@ -29524,7 +29294,7 @@
               <a:t> </a:t>
             </a:r>
             <a:r>
-              <a:rPr lang="it-IT" altLang="it-IT" sz="2000" b="1" dirty="0" err="1" smtClean="0">
+              <a:rPr lang="it-IT" altLang="it-IT" sz="2000" b="1" dirty="0" smtClean="0">
                 <a:solidFill>
                   <a:srgbClr val="C00000"/>
                 </a:solidFill>
@@ -30252,23 +30022,7 @@
                   <a:srgbClr val="C00000"/>
                 </a:solidFill>
               </a:rPr>
-              <a:t>from </a:t>
-            </a:r>
-            <a:r>
-              <a:rPr lang="it-IT" altLang="it-IT" dirty="0" err="1" smtClean="0">
-                <a:solidFill>
-                  <a:srgbClr val="C00000"/>
-                </a:solidFill>
-              </a:rPr>
-              <a:t>RJDemetra</a:t>
-            </a:r>
-            <a:r>
-              <a:rPr lang="it-IT" altLang="it-IT" dirty="0" smtClean="0">
-                <a:solidFill>
-                  <a:srgbClr val="C00000"/>
-                </a:solidFill>
-              </a:rPr>
-              <a:t> </a:t>
+              <a:t>from RJDemetra </a:t>
             </a:r>
             <a:r>
               <a:rPr lang="it-IT" altLang="it-IT" dirty="0" err="1" smtClean="0">
@@ -30454,23 +30208,7 @@
                   <a:srgbClr val="C00000"/>
                 </a:solidFill>
               </a:rPr>
-              <a:t>SOURCE:  </a:t>
-            </a:r>
-            <a:r>
-              <a:rPr lang="it-IT" b="1" dirty="0" err="1" smtClean="0">
-                <a:solidFill>
-                  <a:srgbClr val="C00000"/>
-                </a:solidFill>
-              </a:rPr>
-              <a:t>RJDemetra</a:t>
-            </a:r>
-            <a:r>
-              <a:rPr lang="it-IT" b="1" dirty="0" smtClean="0">
-                <a:solidFill>
-                  <a:srgbClr val="C00000"/>
-                </a:solidFill>
-              </a:rPr>
-              <a:t> </a:t>
+              <a:t>SOURCE:  RJDemetra </a:t>
             </a:r>
             <a:r>
               <a:rPr lang="it-IT" b="1" dirty="0" err="1" smtClean="0">
@@ -32179,15 +31917,15 @@
 <file path=customXml/itemProps3.xml><?xml version="1.0" encoding="utf-8"?>
 <ds:datastoreItem xmlns:ds="http://schemas.openxmlformats.org/officeDocument/2006/customXml" ds:itemID="{3EF378BC-F4D0-4510-B4EC-07B6EFE18CF8}">
   <ds:schemaRefs>
+    <ds:schemaRef ds:uri="http://schemas.microsoft.com/office/infopath/2007/PartnerControls"/>
+    <ds:schemaRef ds:uri="http://purl.org/dc/dcmitype/"/>
+    <ds:schemaRef ds:uri="c58f2efd-82a8-4ecf-b395-8c25e928921d"/>
     <ds:schemaRef ds:uri="http://schemas.microsoft.com/office/2006/metadata/properties"/>
     <ds:schemaRef ds:uri="http://www.w3.org/XML/1998/namespace"/>
+    <ds:schemaRef ds:uri="http://schemas.microsoft.com/office/2006/documentManagement/types"/>
+    <ds:schemaRef ds:uri="679261c3-551f-4e86-913f-177e0e529669"/>
     <ds:schemaRef ds:uri="http://purl.org/dc/elements/1.1/"/>
-    <ds:schemaRef ds:uri="http://schemas.microsoft.com/office/infopath/2007/PartnerControls"/>
-    <ds:schemaRef ds:uri="http://schemas.microsoft.com/office/2006/documentManagement/types"/>
-    <ds:schemaRef ds:uri="http://purl.org/dc/dcmitype/"/>
-    <ds:schemaRef ds:uri="c58f2efd-82a8-4ecf-b395-8c25e928921d"/>
     <ds:schemaRef ds:uri="http://schemas.openxmlformats.org/package/2006/metadata/core-properties"/>
-    <ds:schemaRef ds:uri="679261c3-551f-4e86-913f-177e0e529669"/>
     <ds:schemaRef ds:uri="459159c4-d20a-4ff3-9b11-fbd127bd52e5"/>
     <ds:schemaRef ds:uri="http://purl.org/dc/terms/"/>
   </ds:schemaRefs>

</xml_diff>